<commit_message>
finished up class 3
</commit_message>
<xml_diff>
--- a/Class 03 Multivariate Normal Distribution.pptx
+++ b/Class 03 Multivariate Normal Distribution.pptx
@@ -5,38 +5,36 @@
     <p:sldMasterId id="2147483648" r:id="rId1"/>
   </p:sldMasterIdLst>
   <p:notesMasterIdLst>
-    <p:notesMasterId r:id="rId31"/>
+    <p:notesMasterId r:id="rId29"/>
   </p:notesMasterIdLst>
   <p:sldIdLst>
     <p:sldId id="256" r:id="rId2"/>
-    <p:sldId id="288" r:id="rId3"/>
-    <p:sldId id="289" r:id="rId4"/>
-    <p:sldId id="290" r:id="rId5"/>
-    <p:sldId id="291" r:id="rId6"/>
-    <p:sldId id="293" r:id="rId7"/>
-    <p:sldId id="292" r:id="rId8"/>
-    <p:sldId id="294" r:id="rId9"/>
-    <p:sldId id="295" r:id="rId10"/>
-    <p:sldId id="296" r:id="rId11"/>
-    <p:sldId id="297" r:id="rId12"/>
-    <p:sldId id="300" r:id="rId13"/>
-    <p:sldId id="299" r:id="rId14"/>
-    <p:sldId id="298" r:id="rId15"/>
-    <p:sldId id="301" r:id="rId16"/>
-    <p:sldId id="302" r:id="rId17"/>
-    <p:sldId id="303" r:id="rId18"/>
-    <p:sldId id="304" r:id="rId19"/>
-    <p:sldId id="306" r:id="rId20"/>
-    <p:sldId id="305" r:id="rId21"/>
-    <p:sldId id="307" r:id="rId22"/>
-    <p:sldId id="308" r:id="rId23"/>
-    <p:sldId id="309" r:id="rId24"/>
-    <p:sldId id="310" r:id="rId25"/>
-    <p:sldId id="311" r:id="rId26"/>
-    <p:sldId id="287" r:id="rId27"/>
-    <p:sldId id="312" r:id="rId28"/>
-    <p:sldId id="313" r:id="rId29"/>
-    <p:sldId id="315" r:id="rId30"/>
+    <p:sldId id="316" r:id="rId3"/>
+    <p:sldId id="317" r:id="rId4"/>
+    <p:sldId id="318" r:id="rId5"/>
+    <p:sldId id="319" r:id="rId6"/>
+    <p:sldId id="320" r:id="rId7"/>
+    <p:sldId id="321" r:id="rId8"/>
+    <p:sldId id="322" r:id="rId9"/>
+    <p:sldId id="323" r:id="rId10"/>
+    <p:sldId id="324" r:id="rId11"/>
+    <p:sldId id="325" r:id="rId12"/>
+    <p:sldId id="326" r:id="rId13"/>
+    <p:sldId id="327" r:id="rId14"/>
+    <p:sldId id="328" r:id="rId15"/>
+    <p:sldId id="329" r:id="rId16"/>
+    <p:sldId id="330" r:id="rId17"/>
+    <p:sldId id="331" r:id="rId18"/>
+    <p:sldId id="332" r:id="rId19"/>
+    <p:sldId id="333" r:id="rId20"/>
+    <p:sldId id="334" r:id="rId21"/>
+    <p:sldId id="335" r:id="rId22"/>
+    <p:sldId id="336" r:id="rId23"/>
+    <p:sldId id="337" r:id="rId24"/>
+    <p:sldId id="338" r:id="rId25"/>
+    <p:sldId id="339" r:id="rId26"/>
+    <p:sldId id="340" r:id="rId27"/>
+    <p:sldId id="315" r:id="rId28"/>
   </p:sldIdLst>
   <p:sldSz cx="12192000" cy="6858000"/>
   <p:notesSz cx="6858000" cy="9144000"/>
@@ -141,33 +139,31 @@
         <p14:section name="Default Section" id="{7D91CE89-B478-0547-82DC-C5D911243885}">
           <p14:sldIdLst>
             <p14:sldId id="256"/>
-            <p14:sldId id="288"/>
-            <p14:sldId id="289"/>
-            <p14:sldId id="290"/>
-            <p14:sldId id="291"/>
-            <p14:sldId id="293"/>
-            <p14:sldId id="292"/>
-            <p14:sldId id="294"/>
-            <p14:sldId id="295"/>
-            <p14:sldId id="296"/>
-            <p14:sldId id="297"/>
-            <p14:sldId id="300"/>
-            <p14:sldId id="299"/>
-            <p14:sldId id="298"/>
-            <p14:sldId id="301"/>
-            <p14:sldId id="302"/>
-            <p14:sldId id="303"/>
-            <p14:sldId id="304"/>
-            <p14:sldId id="306"/>
-            <p14:sldId id="305"/>
-            <p14:sldId id="307"/>
-            <p14:sldId id="308"/>
-            <p14:sldId id="309"/>
-            <p14:sldId id="310"/>
-            <p14:sldId id="311"/>
-            <p14:sldId id="287"/>
-            <p14:sldId id="312"/>
-            <p14:sldId id="313"/>
+            <p14:sldId id="316"/>
+            <p14:sldId id="317"/>
+            <p14:sldId id="318"/>
+            <p14:sldId id="319"/>
+            <p14:sldId id="320"/>
+            <p14:sldId id="321"/>
+            <p14:sldId id="322"/>
+            <p14:sldId id="323"/>
+            <p14:sldId id="324"/>
+            <p14:sldId id="325"/>
+            <p14:sldId id="326"/>
+            <p14:sldId id="327"/>
+            <p14:sldId id="328"/>
+            <p14:sldId id="329"/>
+            <p14:sldId id="330"/>
+            <p14:sldId id="331"/>
+            <p14:sldId id="332"/>
+            <p14:sldId id="333"/>
+            <p14:sldId id="334"/>
+            <p14:sldId id="335"/>
+            <p14:sldId id="336"/>
+            <p14:sldId id="337"/>
+            <p14:sldId id="338"/>
+            <p14:sldId id="339"/>
+            <p14:sldId id="340"/>
             <p14:sldId id="315"/>
           </p14:sldIdLst>
         </p14:section>
@@ -527,90 +523,6 @@
     </a:lvl9pPr>
   </p:notesStyle>
 </p:notesMaster>
-</file>
-
-<file path=ppt/notesSlides/notesSlide1.xml><?xml version="1.0" encoding="utf-8"?>
-<p:notes xmlns:a="http://schemas.openxmlformats.org/drawingml/2006/main" xmlns:r="http://schemas.openxmlformats.org/officeDocument/2006/relationships" xmlns:p="http://schemas.openxmlformats.org/presentationml/2006/main">
-  <p:cSld>
-    <p:spTree>
-      <p:nvGrpSpPr>
-        <p:cNvPr id="1" name=""/>
-        <p:cNvGrpSpPr/>
-        <p:nvPr/>
-      </p:nvGrpSpPr>
-      <p:grpSpPr>
-        <a:xfrm>
-          <a:off x="0" y="0"/>
-          <a:ext cx="0" cy="0"/>
-          <a:chOff x="0" y="0"/>
-          <a:chExt cx="0" cy="0"/>
-        </a:xfrm>
-      </p:grpSpPr>
-      <p:sp>
-        <p:nvSpPr>
-          <p:cNvPr id="2" name="Slide Image Placeholder 1"/>
-          <p:cNvSpPr>
-            <a:spLocks noGrp="1" noRot="1" noChangeAspect="1"/>
-          </p:cNvSpPr>
-          <p:nvPr>
-            <p:ph type="sldImg"/>
-          </p:nvPr>
-        </p:nvSpPr>
-        <p:spPr/>
-      </p:sp>
-      <p:sp>
-        <p:nvSpPr>
-          <p:cNvPr id="3" name="Notes Placeholder 2"/>
-          <p:cNvSpPr>
-            <a:spLocks noGrp="1"/>
-          </p:cNvSpPr>
-          <p:nvPr>
-            <p:ph type="body" idx="1"/>
-          </p:nvPr>
-        </p:nvSpPr>
-        <p:spPr/>
-        <p:txBody>
-          <a:bodyPr/>
-          <a:lstStyle/>
-          <a:p>
-            <a:endParaRPr lang="en-US" dirty="0"/>
-          </a:p>
-        </p:txBody>
-      </p:sp>
-      <p:sp>
-        <p:nvSpPr>
-          <p:cNvPr id="4" name="Slide Number Placeholder 3"/>
-          <p:cNvSpPr>
-            <a:spLocks noGrp="1"/>
-          </p:cNvSpPr>
-          <p:nvPr>
-            <p:ph type="sldNum" sz="quarter" idx="5"/>
-          </p:nvPr>
-        </p:nvSpPr>
-        <p:spPr/>
-        <p:txBody>
-          <a:bodyPr/>
-          <a:lstStyle/>
-          <a:p>
-            <a:fld id="{43238733-7AED-8B42-A60E-276032214EE9}" type="slidenum">
-              <a:rPr lang="en-US" smtClean="0"/>
-              <a:t>10</a:t>
-            </a:fld>
-            <a:endParaRPr lang="en-US"/>
-          </a:p>
-        </p:txBody>
-      </p:sp>
-    </p:spTree>
-    <p:extLst>
-      <p:ext uri="{BB962C8B-B14F-4D97-AF65-F5344CB8AC3E}">
-        <p14:creationId xmlns:p14="http://schemas.microsoft.com/office/powerpoint/2010/main" val="4251234053"/>
-      </p:ext>
-    </p:extLst>
-  </p:cSld>
-  <p:clrMapOvr>
-    <a:masterClrMapping/>
-  </p:clrMapOvr>
-</p:notes>
 </file>
 
 <file path=ppt/slideLayouts/slideLayout1.xml><?xml version="1.0" encoding="utf-8"?>
@@ -3850,7 +3762,7 @@
           <a:p>
             <a:r>
               <a:rPr lang="en-US" dirty="0"/>
-              <a:t>STAT 717: Lecture 2</a:t>
+              <a:t>STAT 717: Lecture 3</a:t>
             </a:r>
           </a:p>
         </p:txBody>
@@ -3871,14 +3783,19 @@
             <p:ph type="subTitle" idx="1"/>
           </p:nvPr>
         </p:nvSpPr>
-        <p:spPr/>
+        <p:spPr>
+          <a:xfrm>
+            <a:off x="1524000" y="3618663"/>
+            <a:ext cx="9144000" cy="1655762"/>
+          </a:xfrm>
+        </p:spPr>
         <p:txBody>
           <a:bodyPr/>
           <a:lstStyle/>
           <a:p>
             <a:r>
               <a:rPr lang="en-US" dirty="0"/>
-              <a:t>Characterizing and Displaying Multivariate Data</a:t>
+              <a:t>Multivariate Normal Density Function</a:t>
             </a:r>
           </a:p>
           <a:p>
@@ -3890,7 +3807,15 @@
           <a:p>
             <a:r>
               <a:rPr lang="en-US" dirty="0"/>
-              <a:t>September 02, 2021</a:t>
+              <a:t>September 10</a:t>
+            </a:r>
+            <a:r>
+              <a:rPr lang="en-US" baseline="30000" dirty="0"/>
+              <a:t>th</a:t>
+            </a:r>
+            <a:r>
+              <a:rPr lang="en-US" dirty="0"/>
+              <a:t>, 2021</a:t>
             </a:r>
           </a:p>
         </p:txBody>
@@ -3930,7 +3855,7 @@
           <p:cNvPr id="2" name="Title 1">
             <a:extLst>
               <a:ext uri="{FF2B5EF4-FFF2-40B4-BE49-F238E27FC236}">
-                <a16:creationId xmlns:a16="http://schemas.microsoft.com/office/drawing/2014/main" id="{47561A66-C7D3-7B40-BCF1-F1851A2110A3}"/>
+                <a16:creationId xmlns:a16="http://schemas.microsoft.com/office/drawing/2014/main" id="{30382077-C778-0347-8609-E8E9617FEC70}"/>
               </a:ext>
             </a:extLst>
           </p:cNvPr>
@@ -3948,47 +3873,70 @@
           <a:p>
             <a:r>
               <a:rPr lang="en-US" dirty="0"/>
-              <a:t>Sample Covariance</a:t>
-            </a:r>
-          </a:p>
-        </p:txBody>
-      </p:sp>
-      <p:pic>
-        <p:nvPicPr>
-          <p:cNvPr id="5" name="Content Placeholder 4">
-            <a:extLst>
-              <a:ext uri="{FF2B5EF4-FFF2-40B4-BE49-F238E27FC236}">
-                <a16:creationId xmlns:a16="http://schemas.microsoft.com/office/drawing/2014/main" id="{663C3C5C-2C68-434B-A1A4-684B786D141E}"/>
-              </a:ext>
-            </a:extLst>
-          </p:cNvPr>
-          <p:cNvPicPr>
-            <a:picLocks noGrp="1" noChangeAspect="1"/>
-          </p:cNvPicPr>
+              <a:t>Normality of Marginal Distributions</a:t>
+            </a:r>
+          </a:p>
+        </p:txBody>
+      </p:sp>
+      <p:sp>
+        <p:nvSpPr>
+          <p:cNvPr id="3" name="Content Placeholder 2">
+            <a:extLst>
+              <a:ext uri="{FF2B5EF4-FFF2-40B4-BE49-F238E27FC236}">
+                <a16:creationId xmlns:a16="http://schemas.microsoft.com/office/drawing/2014/main" id="{00591A02-2B6C-874A-B71D-A16424295126}"/>
+              </a:ext>
+            </a:extLst>
+          </p:cNvPr>
+          <p:cNvSpPr>
+            <a:spLocks noGrp="1"/>
+          </p:cNvSpPr>
           <p:nvPr>
             <p:ph idx="1"/>
           </p:nvPr>
-        </p:nvPicPr>
-        <p:blipFill>
-          <a:blip r:embed="rId3"/>
-          <a:stretch>
-            <a:fillRect/>
-          </a:stretch>
-        </p:blipFill>
-        <p:spPr>
-          <a:xfrm>
-            <a:off x="2355850" y="1395678"/>
-            <a:ext cx="6616700" cy="3924300"/>
-          </a:xfrm>
-          <a:prstGeom prst="rect">
-            <a:avLst/>
-          </a:prstGeom>
-        </p:spPr>
-      </p:pic>
+        </p:nvSpPr>
+        <p:spPr/>
+        <p:txBody>
+          <a:bodyPr/>
+          <a:lstStyle/>
+          <a:p>
+            <a:r>
+              <a:rPr lang="en-US" dirty="0"/>
+              <a:t>Any subset of columns are their own multivariate distribution</a:t>
+            </a:r>
+          </a:p>
+          <a:p>
+            <a:r>
+              <a:rPr lang="en-US" dirty="0"/>
+              <a:t>As a special case, a single column is  a univariate normal</a:t>
+            </a:r>
+          </a:p>
+          <a:p>
+            <a:endParaRPr lang="en-US" dirty="0"/>
+          </a:p>
+          <a:p>
+            <a:r>
+              <a:rPr lang="en-US" dirty="0"/>
+              <a:t>The converse of this is not true. If the density of each </a:t>
+            </a:r>
+            <a:r>
+              <a:rPr lang="en-US" i="1" dirty="0" err="1"/>
+              <a:t>yj</a:t>
+            </a:r>
+            <a:r>
+              <a:rPr lang="en-US" i="1" dirty="0"/>
+              <a:t> </a:t>
+            </a:r>
+            <a:r>
+              <a:rPr lang="en-US" dirty="0"/>
+              <a:t>in y is normal, it does not necessarily follow that y is multivariate normal. </a:t>
+            </a:r>
+          </a:p>
+        </p:txBody>
+      </p:sp>
     </p:spTree>
     <p:extLst>
       <p:ext uri="{BB962C8B-B14F-4D97-AF65-F5344CB8AC3E}">
-        <p14:creationId xmlns:p14="http://schemas.microsoft.com/office/powerpoint/2010/main" val="2809724177"/>
+        <p14:creationId xmlns:p14="http://schemas.microsoft.com/office/powerpoint/2010/main" val="4102547431"/>
       </p:ext>
     </p:extLst>
   </p:cSld>
@@ -4020,7 +3968,7 @@
           <p:cNvPr id="2" name="Title 1">
             <a:extLst>
               <a:ext uri="{FF2B5EF4-FFF2-40B4-BE49-F238E27FC236}">
-                <a16:creationId xmlns:a16="http://schemas.microsoft.com/office/drawing/2014/main" id="{26A932CF-E35F-D04C-8956-67F44B8CB086}"/>
+                <a16:creationId xmlns:a16="http://schemas.microsoft.com/office/drawing/2014/main" id="{DD6C6118-3159-EF4C-9134-6A577E362754}"/>
               </a:ext>
             </a:extLst>
           </p:cNvPr>
@@ -4038,7 +3986,7 @@
           <a:p>
             <a:r>
               <a:rPr lang="en-US" dirty="0"/>
-              <a:t>Slope of simple linear model</a:t>
+              <a:t>Definitions</a:t>
             </a:r>
           </a:p>
         </p:txBody>
@@ -4048,7 +3996,7 @@
           <p:cNvPr id="4" name="Content Placeholder 3">
             <a:extLst>
               <a:ext uri="{FF2B5EF4-FFF2-40B4-BE49-F238E27FC236}">
-                <a16:creationId xmlns:a16="http://schemas.microsoft.com/office/drawing/2014/main" id="{0C9D7A8C-481C-4D4D-B40A-329A5DC88731}"/>
+                <a16:creationId xmlns:a16="http://schemas.microsoft.com/office/drawing/2014/main" id="{E15067B0-ECF4-D849-A744-0C1B9FA5E2CC}"/>
               </a:ext>
             </a:extLst>
           </p:cNvPr>
@@ -4067,8 +4015,8 @@
         </p:blipFill>
         <p:spPr>
           <a:xfrm>
-            <a:off x="1847850" y="3036094"/>
-            <a:ext cx="8496300" cy="1930400"/>
+            <a:off x="2571750" y="3112294"/>
+            <a:ext cx="7048500" cy="1778000"/>
           </a:xfrm>
           <a:prstGeom prst="rect">
             <a:avLst/>
@@ -4078,7 +4026,7 @@
     </p:spTree>
     <p:extLst>
       <p:ext uri="{BB962C8B-B14F-4D97-AF65-F5344CB8AC3E}">
-        <p14:creationId xmlns:p14="http://schemas.microsoft.com/office/powerpoint/2010/main" val="3435041226"/>
+        <p14:creationId xmlns:p14="http://schemas.microsoft.com/office/powerpoint/2010/main" val="3773723494"/>
       </p:ext>
     </p:extLst>
   </p:cSld>
@@ -4110,7 +4058,7 @@
           <p:cNvPr id="2" name="Title 1">
             <a:extLst>
               <a:ext uri="{FF2B5EF4-FFF2-40B4-BE49-F238E27FC236}">
-                <a16:creationId xmlns:a16="http://schemas.microsoft.com/office/drawing/2014/main" id="{8B240198-782B-764C-8145-8219C0162F77}"/>
+                <a16:creationId xmlns:a16="http://schemas.microsoft.com/office/drawing/2014/main" id="{8C1F6887-9F3D-D844-ABC5-65FAFD464E64}"/>
               </a:ext>
             </a:extLst>
           </p:cNvPr>
@@ -4128,26 +4076,49 @@
           <a:p>
             <a:r>
               <a:rPr lang="en-US" dirty="0"/>
-              <a:t>Covariance of Height/Weight</a:t>
-            </a:r>
+              <a:t>Independence</a:t>
+            </a:r>
+          </a:p>
+        </p:txBody>
+      </p:sp>
+      <p:sp>
+        <p:nvSpPr>
+          <p:cNvPr id="3" name="Content Placeholder 2">
+            <a:extLst>
+              <a:ext uri="{FF2B5EF4-FFF2-40B4-BE49-F238E27FC236}">
+                <a16:creationId xmlns:a16="http://schemas.microsoft.com/office/drawing/2014/main" id="{A404F452-CA4E-044C-A606-333B14C13E7B}"/>
+              </a:ext>
+            </a:extLst>
+          </p:cNvPr>
+          <p:cNvSpPr>
+            <a:spLocks noGrp="1"/>
+          </p:cNvSpPr>
+          <p:nvPr>
+            <p:ph idx="1"/>
+          </p:nvPr>
+        </p:nvSpPr>
+        <p:spPr/>
+        <p:txBody>
+          <a:bodyPr/>
+          <a:lstStyle/>
+          <a:p>
+            <a:endParaRPr lang="en-US" dirty="0"/>
           </a:p>
         </p:txBody>
       </p:sp>
       <p:pic>
         <p:nvPicPr>
-          <p:cNvPr id="4" name="Content Placeholder 3">
-            <a:extLst>
-              <a:ext uri="{FF2B5EF4-FFF2-40B4-BE49-F238E27FC236}">
-                <a16:creationId xmlns:a16="http://schemas.microsoft.com/office/drawing/2014/main" id="{6269996D-0F9D-A845-A2D0-D315009681F7}"/>
+          <p:cNvPr id="5" name="Picture 4">
+            <a:extLst>
+              <a:ext uri="{FF2B5EF4-FFF2-40B4-BE49-F238E27FC236}">
+                <a16:creationId xmlns:a16="http://schemas.microsoft.com/office/drawing/2014/main" id="{E79362C0-B8ED-6440-AD7B-E7F5E24BCE58}"/>
               </a:ext>
             </a:extLst>
           </p:cNvPr>
           <p:cNvPicPr>
-            <a:picLocks noGrp="1" noChangeAspect="1"/>
+            <a:picLocks noChangeAspect="1"/>
           </p:cNvPicPr>
-          <p:nvPr>
-            <p:ph idx="1"/>
-          </p:nvPr>
+          <p:nvPr/>
         </p:nvPicPr>
         <p:blipFill>
           <a:blip r:embed="rId2"/>
@@ -4157,8 +4128,38 @@
         </p:blipFill>
         <p:spPr>
           <a:xfrm>
-            <a:off x="908050" y="2445544"/>
-            <a:ext cx="10375900" cy="3111500"/>
+            <a:off x="2622550" y="1278407"/>
+            <a:ext cx="6946900" cy="1854200"/>
+          </a:xfrm>
+          <a:prstGeom prst="rect">
+            <a:avLst/>
+          </a:prstGeom>
+        </p:spPr>
+      </p:pic>
+      <p:pic>
+        <p:nvPicPr>
+          <p:cNvPr id="6" name="Picture 5">
+            <a:extLst>
+              <a:ext uri="{FF2B5EF4-FFF2-40B4-BE49-F238E27FC236}">
+                <a16:creationId xmlns:a16="http://schemas.microsoft.com/office/drawing/2014/main" id="{3BDE6828-8996-EE46-86AE-00666FAEE76D}"/>
+              </a:ext>
+            </a:extLst>
+          </p:cNvPr>
+          <p:cNvPicPr>
+            <a:picLocks noChangeAspect="1"/>
+          </p:cNvPicPr>
+          <p:nvPr/>
+        </p:nvPicPr>
+        <p:blipFill>
+          <a:blip r:embed="rId3"/>
+          <a:stretch>
+            <a:fillRect/>
+          </a:stretch>
+        </p:blipFill>
+        <p:spPr>
+          <a:xfrm>
+            <a:off x="1308100" y="3149600"/>
+            <a:ext cx="9575800" cy="558800"/>
           </a:xfrm>
           <a:prstGeom prst="rect">
             <a:avLst/>
@@ -4168,7 +4169,7 @@
     </p:spTree>
     <p:extLst>
       <p:ext uri="{BB962C8B-B14F-4D97-AF65-F5344CB8AC3E}">
-        <p14:creationId xmlns:p14="http://schemas.microsoft.com/office/powerpoint/2010/main" val="629639328"/>
+        <p14:creationId xmlns:p14="http://schemas.microsoft.com/office/powerpoint/2010/main" val="2149972288"/>
       </p:ext>
     </p:extLst>
   </p:cSld>
@@ -4200,7 +4201,7 @@
           <p:cNvPr id="2" name="Title 1">
             <a:extLst>
               <a:ext uri="{FF2B5EF4-FFF2-40B4-BE49-F238E27FC236}">
-                <a16:creationId xmlns:a16="http://schemas.microsoft.com/office/drawing/2014/main" id="{AF4FAD19-1FE2-3C47-B455-BA5D7A1DA1A9}"/>
+                <a16:creationId xmlns:a16="http://schemas.microsoft.com/office/drawing/2014/main" id="{6BA08547-65FE-8246-8C59-01010FE6C588}"/>
               </a:ext>
             </a:extLst>
           </p:cNvPr>
@@ -4218,40 +4219,47 @@
           <a:p>
             <a:r>
               <a:rPr lang="en-US" dirty="0"/>
-              <a:t>What are some problems with covariance?</a:t>
-            </a:r>
-          </a:p>
-        </p:txBody>
-      </p:sp>
-      <p:sp>
-        <p:nvSpPr>
-          <p:cNvPr id="3" name="Content Placeholder 2">
-            <a:extLst>
-              <a:ext uri="{FF2B5EF4-FFF2-40B4-BE49-F238E27FC236}">
-                <a16:creationId xmlns:a16="http://schemas.microsoft.com/office/drawing/2014/main" id="{8F7B7C5A-0BF8-3F41-9E8E-86601C05316B}"/>
-              </a:ext>
-            </a:extLst>
-          </p:cNvPr>
-          <p:cNvSpPr>
-            <a:spLocks noGrp="1"/>
-          </p:cNvSpPr>
+              <a:t>Conditional Distribution</a:t>
+            </a:r>
+          </a:p>
+        </p:txBody>
+      </p:sp>
+      <p:pic>
+        <p:nvPicPr>
+          <p:cNvPr id="4" name="Content Placeholder 3">
+            <a:extLst>
+              <a:ext uri="{FF2B5EF4-FFF2-40B4-BE49-F238E27FC236}">
+                <a16:creationId xmlns:a16="http://schemas.microsoft.com/office/drawing/2014/main" id="{3AB293BA-81C2-3E40-A0EE-7D54A64130DD}"/>
+              </a:ext>
+            </a:extLst>
+          </p:cNvPr>
+          <p:cNvPicPr>
+            <a:picLocks noGrp="1" noChangeAspect="1"/>
+          </p:cNvPicPr>
           <p:nvPr>
             <p:ph idx="1"/>
           </p:nvPr>
-        </p:nvSpPr>
-        <p:spPr/>
-        <p:txBody>
-          <a:bodyPr/>
-          <a:lstStyle/>
-          <a:p>
-            <a:endParaRPr lang="en-US"/>
-          </a:p>
-        </p:txBody>
-      </p:sp>
+        </p:nvPicPr>
+        <p:blipFill>
+          <a:blip r:embed="rId2"/>
+          <a:stretch>
+            <a:fillRect/>
+          </a:stretch>
+        </p:blipFill>
+        <p:spPr>
+          <a:xfrm>
+            <a:off x="838200" y="2812822"/>
+            <a:ext cx="10515600" cy="2376943"/>
+          </a:xfrm>
+          <a:prstGeom prst="rect">
+            <a:avLst/>
+          </a:prstGeom>
+        </p:spPr>
+      </p:pic>
     </p:spTree>
     <p:extLst>
       <p:ext uri="{BB962C8B-B14F-4D97-AF65-F5344CB8AC3E}">
-        <p14:creationId xmlns:p14="http://schemas.microsoft.com/office/powerpoint/2010/main" val="855991282"/>
+        <p14:creationId xmlns:p14="http://schemas.microsoft.com/office/powerpoint/2010/main" val="3310643174"/>
       </p:ext>
     </p:extLst>
   </p:cSld>
@@ -4283,7 +4291,7 @@
           <p:cNvPr id="2" name="Title 1">
             <a:extLst>
               <a:ext uri="{FF2B5EF4-FFF2-40B4-BE49-F238E27FC236}">
-                <a16:creationId xmlns:a16="http://schemas.microsoft.com/office/drawing/2014/main" id="{FDA0D88C-AC57-2D44-AEFD-5846041C1A7E}"/>
+                <a16:creationId xmlns:a16="http://schemas.microsoft.com/office/drawing/2014/main" id="{AA4A3E1C-AD77-4A42-B367-2A0F2C2F6188}"/>
               </a:ext>
             </a:extLst>
           </p:cNvPr>
@@ -4301,8 +4309,13 @@
           <a:p>
             <a:r>
               <a:rPr lang="en-US" dirty="0"/>
-              <a:t>Correlation</a:t>
-            </a:r>
+              <a:t>Distribution of the sum of two </a:t>
+            </a:r>
+            <a:r>
+              <a:rPr lang="en-US" dirty="0" err="1"/>
+              <a:t>subvectors</a:t>
+            </a:r>
+            <a:endParaRPr lang="en-US" dirty="0"/>
           </a:p>
         </p:txBody>
       </p:sp>
@@ -4311,7 +4324,7 @@
           <p:cNvPr id="4" name="Content Placeholder 3">
             <a:extLst>
               <a:ext uri="{FF2B5EF4-FFF2-40B4-BE49-F238E27FC236}">
-                <a16:creationId xmlns:a16="http://schemas.microsoft.com/office/drawing/2014/main" id="{C5A81724-E77F-6140-B265-C937665A4588}"/>
+                <a16:creationId xmlns:a16="http://schemas.microsoft.com/office/drawing/2014/main" id="{FBC539AC-204D-7E41-8F91-17EE72B8A435}"/>
               </a:ext>
             </a:extLst>
           </p:cNvPr>
@@ -4330,18 +4343,53 @@
         </p:blipFill>
         <p:spPr>
           <a:xfrm>
-            <a:off x="838200" y="3066442"/>
-            <a:ext cx="10515600" cy="1869704"/>
+            <a:off x="2209800" y="2763044"/>
+            <a:ext cx="7772400" cy="2476500"/>
           </a:xfrm>
           <a:prstGeom prst="rect">
             <a:avLst/>
           </a:prstGeom>
         </p:spPr>
       </p:pic>
+      <p:sp>
+        <p:nvSpPr>
+          <p:cNvPr id="5" name="TextBox 4">
+            <a:extLst>
+              <a:ext uri="{FF2B5EF4-FFF2-40B4-BE49-F238E27FC236}">
+                <a16:creationId xmlns:a16="http://schemas.microsoft.com/office/drawing/2014/main" id="{01181861-8C76-E54E-9A59-1DF36FE5DD6D}"/>
+              </a:ext>
+            </a:extLst>
+          </p:cNvPr>
+          <p:cNvSpPr txBox="1"/>
+          <p:nvPr/>
+        </p:nvSpPr>
+        <p:spPr>
+          <a:xfrm>
+            <a:off x="1004552" y="1690688"/>
+            <a:ext cx="2765309" cy="369332"/>
+          </a:xfrm>
+          <a:prstGeom prst="rect">
+            <a:avLst/>
+          </a:prstGeom>
+          <a:noFill/>
+        </p:spPr>
+        <p:txBody>
+          <a:bodyPr wrap="none" rtlCol="0">
+            <a:spAutoFit/>
+          </a:bodyPr>
+          <a:lstStyle/>
+          <a:p>
+            <a:r>
+              <a:rPr lang="en-US" dirty="0"/>
+              <a:t>If y and x are the same size:</a:t>
+            </a:r>
+          </a:p>
+        </p:txBody>
+      </p:sp>
     </p:spTree>
     <p:extLst>
       <p:ext uri="{BB962C8B-B14F-4D97-AF65-F5344CB8AC3E}">
-        <p14:creationId xmlns:p14="http://schemas.microsoft.com/office/powerpoint/2010/main" val="1641149021"/>
+        <p14:creationId xmlns:p14="http://schemas.microsoft.com/office/powerpoint/2010/main" val="1311907180"/>
       </p:ext>
     </p:extLst>
   </p:cSld>
@@ -4370,10 +4418,10 @@
       </p:grpSpPr>
       <p:sp>
         <p:nvSpPr>
-          <p:cNvPr id="2" name="Title 1">
-            <a:extLst>
-              <a:ext uri="{FF2B5EF4-FFF2-40B4-BE49-F238E27FC236}">
-                <a16:creationId xmlns:a16="http://schemas.microsoft.com/office/drawing/2014/main" id="{5C26F5DB-C1DA-854D-91C9-25EC0952A18B}"/>
+          <p:cNvPr id="4" name="Title 3">
+            <a:extLst>
+              <a:ext uri="{FF2B5EF4-FFF2-40B4-BE49-F238E27FC236}">
+                <a16:creationId xmlns:a16="http://schemas.microsoft.com/office/drawing/2014/main" id="{31B8D77F-BFD7-9248-983E-29606667BC40}"/>
               </a:ext>
             </a:extLst>
           </p:cNvPr>
@@ -4391,106 +4439,40 @@
           <a:p>
             <a:r>
               <a:rPr lang="en-US" dirty="0"/>
-              <a:t>Visualization</a:t>
-            </a:r>
-          </a:p>
-        </p:txBody>
-      </p:sp>
-      <p:sp>
-        <p:nvSpPr>
-          <p:cNvPr id="3" name="Content Placeholder 2">
-            <a:extLst>
-              <a:ext uri="{FF2B5EF4-FFF2-40B4-BE49-F238E27FC236}">
-                <a16:creationId xmlns:a16="http://schemas.microsoft.com/office/drawing/2014/main" id="{44519AB7-91CB-3E4E-B6EB-5A063D9B5211}"/>
-              </a:ext>
-            </a:extLst>
-          </p:cNvPr>
-          <p:cNvSpPr>
-            <a:spLocks noGrp="1"/>
-          </p:cNvSpPr>
-          <p:nvPr>
-            <p:ph idx="1"/>
-          </p:nvPr>
-        </p:nvSpPr>
-        <p:spPr/>
-        <p:txBody>
-          <a:bodyPr/>
-          <a:lstStyle/>
-          <a:p>
-            <a:r>
-              <a:rPr lang="en-US" dirty="0"/>
-              <a:t>More later – but this one in the book is wild to me</a:t>
-            </a:r>
-          </a:p>
-          <a:p>
-            <a:endParaRPr lang="en-US" dirty="0"/>
-          </a:p>
-        </p:txBody>
-      </p:sp>
-      <p:pic>
-        <p:nvPicPr>
-          <p:cNvPr id="4" name="Picture 3">
-            <a:extLst>
-              <a:ext uri="{FF2B5EF4-FFF2-40B4-BE49-F238E27FC236}">
-                <a16:creationId xmlns:a16="http://schemas.microsoft.com/office/drawing/2014/main" id="{2690FDC9-64C9-B64D-A05E-FB6682EBFDD3}"/>
-              </a:ext>
-            </a:extLst>
-          </p:cNvPr>
-          <p:cNvPicPr>
-            <a:picLocks noChangeAspect="1"/>
-          </p:cNvPicPr>
-          <p:nvPr/>
-        </p:nvPicPr>
-        <p:blipFill>
-          <a:blip r:embed="rId2"/>
-          <a:stretch>
-            <a:fillRect/>
-          </a:stretch>
-        </p:blipFill>
-        <p:spPr>
-          <a:xfrm>
-            <a:off x="1447800" y="4588933"/>
-            <a:ext cx="9296400" cy="1479629"/>
-          </a:xfrm>
-          <a:prstGeom prst="rect">
-            <a:avLst/>
-          </a:prstGeom>
-        </p:spPr>
-      </p:pic>
-      <p:pic>
-        <p:nvPicPr>
-          <p:cNvPr id="6" name="Picture 5">
-            <a:extLst>
-              <a:ext uri="{FF2B5EF4-FFF2-40B4-BE49-F238E27FC236}">
-                <a16:creationId xmlns:a16="http://schemas.microsoft.com/office/drawing/2014/main" id="{B21C4BBE-7770-E641-99C0-FD04BA319976}"/>
-              </a:ext>
-            </a:extLst>
-          </p:cNvPr>
-          <p:cNvPicPr>
-            <a:picLocks noChangeAspect="1"/>
-          </p:cNvPicPr>
-          <p:nvPr/>
-        </p:nvPicPr>
-        <p:blipFill>
-          <a:blip r:embed="rId3"/>
-          <a:stretch>
-            <a:fillRect/>
-          </a:stretch>
-        </p:blipFill>
-        <p:spPr>
-          <a:xfrm>
-            <a:off x="1447800" y="2529494"/>
-            <a:ext cx="5079547" cy="2168344"/>
-          </a:xfrm>
-          <a:prstGeom prst="rect">
-            <a:avLst/>
-          </a:prstGeom>
-        </p:spPr>
-      </p:pic>
+              <a:t>Estimation in the multivariate normal</a:t>
+            </a:r>
+          </a:p>
+        </p:txBody>
+      </p:sp>
+      <p:sp>
+        <p:nvSpPr>
+          <p:cNvPr id="5" name="Text Placeholder 4">
+            <a:extLst>
+              <a:ext uri="{FF2B5EF4-FFF2-40B4-BE49-F238E27FC236}">
+                <a16:creationId xmlns:a16="http://schemas.microsoft.com/office/drawing/2014/main" id="{FE621123-2E8F-1C40-9CD4-4C796DDF9B88}"/>
+              </a:ext>
+            </a:extLst>
+          </p:cNvPr>
+          <p:cNvSpPr>
+            <a:spLocks noGrp="1"/>
+          </p:cNvSpPr>
+          <p:nvPr>
+            <p:ph type="body" idx="1"/>
+          </p:nvPr>
+        </p:nvSpPr>
+        <p:spPr/>
+        <p:txBody>
+          <a:bodyPr/>
+          <a:lstStyle/>
+          <a:p>
+            <a:endParaRPr lang="en-US"/>
+          </a:p>
+        </p:txBody>
+      </p:sp>
     </p:spTree>
     <p:extLst>
       <p:ext uri="{BB962C8B-B14F-4D97-AF65-F5344CB8AC3E}">
-        <p14:creationId xmlns:p14="http://schemas.microsoft.com/office/powerpoint/2010/main" val="1317977351"/>
+        <p14:creationId xmlns:p14="http://schemas.microsoft.com/office/powerpoint/2010/main" val="2486574587"/>
       </p:ext>
     </p:extLst>
   </p:cSld>
@@ -4522,7 +4504,7 @@
           <p:cNvPr id="2" name="Title 1">
             <a:extLst>
               <a:ext uri="{FF2B5EF4-FFF2-40B4-BE49-F238E27FC236}">
-                <a16:creationId xmlns:a16="http://schemas.microsoft.com/office/drawing/2014/main" id="{C8CADDE8-B885-4F4C-9342-FE2A5914A991}"/>
+                <a16:creationId xmlns:a16="http://schemas.microsoft.com/office/drawing/2014/main" id="{6A50393C-CDF5-9A44-AF20-C4E342FE7980}"/>
               </a:ext>
             </a:extLst>
           </p:cNvPr>
@@ -4539,69 +4521,31 @@
           <a:lstStyle/>
           <a:p>
             <a:r>
+              <a:rPr lang="en-US"/>
+              <a:t>Maximum Likelihood </a:t>
+            </a:r>
+            <a:r>
               <a:rPr lang="en-US" dirty="0"/>
-              <a:t>Mean Vectors</a:t>
-            </a:r>
-          </a:p>
-        </p:txBody>
-      </p:sp>
-      <p:sp>
-        <p:nvSpPr>
-          <p:cNvPr id="3" name="Content Placeholder 2">
-            <a:extLst>
-              <a:ext uri="{FF2B5EF4-FFF2-40B4-BE49-F238E27FC236}">
-                <a16:creationId xmlns:a16="http://schemas.microsoft.com/office/drawing/2014/main" id="{18F3B73A-9994-2F45-BE2E-4E2645EFBB13}"/>
-              </a:ext>
-            </a:extLst>
-          </p:cNvPr>
-          <p:cNvSpPr>
-            <a:spLocks noGrp="1"/>
-          </p:cNvSpPr>
-          <p:nvPr>
-            <p:ph idx="1"/>
-          </p:nvPr>
-        </p:nvSpPr>
-        <p:spPr>
-          <a:xfrm>
-            <a:off x="6096000" y="1825625"/>
-            <a:ext cx="5257800" cy="4351338"/>
-          </a:xfrm>
-        </p:spPr>
-        <p:txBody>
-          <a:bodyPr/>
-          <a:lstStyle/>
-          <a:p>
-            <a:r>
-              <a:rPr lang="en-US" dirty="0"/>
-              <a:t>Each row contains all the observations for the </a:t>
-            </a:r>
-            <a:r>
-              <a:rPr lang="en-US" dirty="0" err="1"/>
-              <a:t>jth</a:t>
-            </a:r>
-            <a:r>
-              <a:rPr lang="en-US" dirty="0"/>
-              <a:t> measurement (for example weight)</a:t>
-            </a:r>
-          </a:p>
-          <a:p>
-            <a:endParaRPr lang="en-US" dirty="0"/>
+              <a:t>Estimation</a:t>
+            </a:r>
           </a:p>
         </p:txBody>
       </p:sp>
       <p:pic>
         <p:nvPicPr>
-          <p:cNvPr id="4" name="Picture 3">
-            <a:extLst>
-              <a:ext uri="{FF2B5EF4-FFF2-40B4-BE49-F238E27FC236}">
-                <a16:creationId xmlns:a16="http://schemas.microsoft.com/office/drawing/2014/main" id="{27007CF4-DD09-B34E-9A98-1D5CC26EC2EE}"/>
+          <p:cNvPr id="4" name="Content Placeholder 3">
+            <a:extLst>
+              <a:ext uri="{FF2B5EF4-FFF2-40B4-BE49-F238E27FC236}">
+                <a16:creationId xmlns:a16="http://schemas.microsoft.com/office/drawing/2014/main" id="{33AD6965-C92B-1441-B1CD-1BBA05A213F2}"/>
               </a:ext>
             </a:extLst>
           </p:cNvPr>
           <p:cNvPicPr>
-            <a:picLocks noChangeAspect="1"/>
+            <a:picLocks noGrp="1" noChangeAspect="1"/>
           </p:cNvPicPr>
-          <p:nvPr/>
+          <p:nvPr>
+            <p:ph idx="1"/>
+          </p:nvPr>
         </p:nvPicPr>
         <p:blipFill>
           <a:blip r:embed="rId2"/>
@@ -4611,38 +4555,8 @@
         </p:blipFill>
         <p:spPr>
           <a:xfrm>
-            <a:off x="1473200" y="1412148"/>
-            <a:ext cx="2277533" cy="2016852"/>
-          </a:xfrm>
-          <a:prstGeom prst="rect">
-            <a:avLst/>
-          </a:prstGeom>
-        </p:spPr>
-      </p:pic>
-      <p:pic>
-        <p:nvPicPr>
-          <p:cNvPr id="6" name="Picture 5">
-            <a:extLst>
-              <a:ext uri="{FF2B5EF4-FFF2-40B4-BE49-F238E27FC236}">
-                <a16:creationId xmlns:a16="http://schemas.microsoft.com/office/drawing/2014/main" id="{54142206-EFC2-E248-A447-868B9615B644}"/>
-              </a:ext>
-            </a:extLst>
-          </p:cNvPr>
-          <p:cNvPicPr>
-            <a:picLocks noChangeAspect="1"/>
-          </p:cNvPicPr>
-          <p:nvPr/>
-        </p:nvPicPr>
-        <p:blipFill>
-          <a:blip r:embed="rId3"/>
-          <a:stretch>
-            <a:fillRect/>
-          </a:stretch>
-        </p:blipFill>
-        <p:spPr>
-          <a:xfrm>
-            <a:off x="499534" y="3914280"/>
-            <a:ext cx="5257800" cy="2088071"/>
+            <a:off x="2966294" y="1825625"/>
+            <a:ext cx="6259411" cy="4351338"/>
           </a:xfrm>
           <a:prstGeom prst="rect">
             <a:avLst/>
@@ -4652,7 +4566,7 @@
     </p:spTree>
     <p:extLst>
       <p:ext uri="{BB962C8B-B14F-4D97-AF65-F5344CB8AC3E}">
-        <p14:creationId xmlns:p14="http://schemas.microsoft.com/office/powerpoint/2010/main" val="3934233559"/>
+        <p14:creationId xmlns:p14="http://schemas.microsoft.com/office/powerpoint/2010/main" val="4246150994"/>
       </p:ext>
     </p:extLst>
   </p:cSld>
@@ -4684,7 +4598,7 @@
           <p:cNvPr id="2" name="Title 1">
             <a:extLst>
               <a:ext uri="{FF2B5EF4-FFF2-40B4-BE49-F238E27FC236}">
-                <a16:creationId xmlns:a16="http://schemas.microsoft.com/office/drawing/2014/main" id="{5F629831-CB96-D943-89F9-F5F1E85141DE}"/>
+                <a16:creationId xmlns:a16="http://schemas.microsoft.com/office/drawing/2014/main" id="{54274CDB-C934-7A44-BA88-AA332835E26D}"/>
               </a:ext>
             </a:extLst>
           </p:cNvPr>
@@ -4702,17 +4616,17 @@
           <a:p>
             <a:r>
               <a:rPr lang="en-US" dirty="0"/>
-              <a:t>Mean Vectors</a:t>
+              <a:t>Distribution of y bar</a:t>
             </a:r>
           </a:p>
         </p:txBody>
       </p:sp>
       <p:pic>
         <p:nvPicPr>
-          <p:cNvPr id="6" name="Content Placeholder 5">
-            <a:extLst>
-              <a:ext uri="{FF2B5EF4-FFF2-40B4-BE49-F238E27FC236}">
-                <a16:creationId xmlns:a16="http://schemas.microsoft.com/office/drawing/2014/main" id="{8B17E73B-B16C-A145-963E-DFBFDAA736D7}"/>
+          <p:cNvPr id="4" name="Content Placeholder 3">
+            <a:extLst>
+              <a:ext uri="{FF2B5EF4-FFF2-40B4-BE49-F238E27FC236}">
+                <a16:creationId xmlns:a16="http://schemas.microsoft.com/office/drawing/2014/main" id="{35D74B71-7272-6C49-A83A-C3539F1C43CE}"/>
               </a:ext>
             </a:extLst>
           </p:cNvPr>
@@ -4731,8 +4645,8 @@
         </p:blipFill>
         <p:spPr>
           <a:xfrm>
-            <a:off x="5940033" y="3826902"/>
-            <a:ext cx="2034117" cy="2581306"/>
+            <a:off x="838200" y="2123074"/>
+            <a:ext cx="10515600" cy="923088"/>
           </a:xfrm>
           <a:prstGeom prst="rect">
             <a:avLst/>
@@ -4741,10 +4655,10 @@
       </p:pic>
       <p:pic>
         <p:nvPicPr>
-          <p:cNvPr id="4" name="Picture 3">
-            <a:extLst>
-              <a:ext uri="{FF2B5EF4-FFF2-40B4-BE49-F238E27FC236}">
-                <a16:creationId xmlns:a16="http://schemas.microsoft.com/office/drawing/2014/main" id="{CC1DD368-AD68-F64A-8077-28ED225524E9}"/>
+          <p:cNvPr id="5" name="Picture 4">
+            <a:extLst>
+              <a:ext uri="{FF2B5EF4-FFF2-40B4-BE49-F238E27FC236}">
+                <a16:creationId xmlns:a16="http://schemas.microsoft.com/office/drawing/2014/main" id="{B41F2744-9E6F-F747-8304-7E85AD5EA296}"/>
               </a:ext>
             </a:extLst>
           </p:cNvPr>
@@ -4761,68 +4675,8 @@
         </p:blipFill>
         <p:spPr>
           <a:xfrm>
-            <a:off x="1227666" y="3129227"/>
-            <a:ext cx="2841351" cy="1744133"/>
-          </a:xfrm>
-          <a:prstGeom prst="rect">
-            <a:avLst/>
-          </a:prstGeom>
-        </p:spPr>
-      </p:pic>
-      <p:pic>
-        <p:nvPicPr>
-          <p:cNvPr id="5" name="Picture 4">
-            <a:extLst>
-              <a:ext uri="{FF2B5EF4-FFF2-40B4-BE49-F238E27FC236}">
-                <a16:creationId xmlns:a16="http://schemas.microsoft.com/office/drawing/2014/main" id="{1C1CC004-F034-2E4B-904F-FD1E2A854A9A}"/>
-              </a:ext>
-            </a:extLst>
-          </p:cNvPr>
-          <p:cNvPicPr>
-            <a:picLocks noChangeAspect="1"/>
-          </p:cNvPicPr>
-          <p:nvPr/>
-        </p:nvPicPr>
-        <p:blipFill>
-          <a:blip r:embed="rId4"/>
-          <a:stretch>
-            <a:fillRect/>
-          </a:stretch>
-        </p:blipFill>
-        <p:spPr>
-          <a:xfrm>
-            <a:off x="6560884" y="776288"/>
-            <a:ext cx="3124200" cy="1828800"/>
-          </a:xfrm>
-          <a:prstGeom prst="rect">
-            <a:avLst/>
-          </a:prstGeom>
-        </p:spPr>
-      </p:pic>
-      <p:pic>
-        <p:nvPicPr>
-          <p:cNvPr id="7" name="Picture 6">
-            <a:extLst>
-              <a:ext uri="{FF2B5EF4-FFF2-40B4-BE49-F238E27FC236}">
-                <a16:creationId xmlns:a16="http://schemas.microsoft.com/office/drawing/2014/main" id="{7B612894-AE7A-F04C-A741-C818A505AE49}"/>
-              </a:ext>
-            </a:extLst>
-          </p:cNvPr>
-          <p:cNvPicPr>
-            <a:picLocks noChangeAspect="1"/>
-          </p:cNvPicPr>
-          <p:nvPr/>
-        </p:nvPicPr>
-        <p:blipFill>
-          <a:blip r:embed="rId5"/>
-          <a:stretch>
-            <a:fillRect/>
-          </a:stretch>
-        </p:blipFill>
-        <p:spPr>
-          <a:xfrm>
-            <a:off x="6957092" y="2605088"/>
-            <a:ext cx="2374900" cy="1358900"/>
+            <a:off x="838200" y="3429000"/>
+            <a:ext cx="10354614" cy="2468086"/>
           </a:xfrm>
           <a:prstGeom prst="rect">
             <a:avLst/>
@@ -4832,7 +4686,7 @@
     </p:spTree>
     <p:extLst>
       <p:ext uri="{BB962C8B-B14F-4D97-AF65-F5344CB8AC3E}">
-        <p14:creationId xmlns:p14="http://schemas.microsoft.com/office/powerpoint/2010/main" val="1751579796"/>
+        <p14:creationId xmlns:p14="http://schemas.microsoft.com/office/powerpoint/2010/main" val="3238038248"/>
       </p:ext>
     </p:extLst>
   </p:cSld>
@@ -4864,7 +4718,7 @@
           <p:cNvPr id="2" name="Title 1">
             <a:extLst>
               <a:ext uri="{FF2B5EF4-FFF2-40B4-BE49-F238E27FC236}">
-                <a16:creationId xmlns:a16="http://schemas.microsoft.com/office/drawing/2014/main" id="{73CE9609-9CB1-DA4B-9449-6C8DC9F420EA}"/>
+                <a16:creationId xmlns:a16="http://schemas.microsoft.com/office/drawing/2014/main" id="{36704C8D-A610-484B-9C8A-413F40B85CAC}"/>
               </a:ext>
             </a:extLst>
           </p:cNvPr>
@@ -4882,49 +4736,26 @@
           <a:p>
             <a:r>
               <a:rPr lang="en-US" dirty="0"/>
-              <a:t>Covariance Matrix</a:t>
-            </a:r>
-          </a:p>
-        </p:txBody>
-      </p:sp>
-      <p:sp>
-        <p:nvSpPr>
-          <p:cNvPr id="3" name="Content Placeholder 2">
-            <a:extLst>
-              <a:ext uri="{FF2B5EF4-FFF2-40B4-BE49-F238E27FC236}">
-                <a16:creationId xmlns:a16="http://schemas.microsoft.com/office/drawing/2014/main" id="{EDD04619-C2BD-3648-9767-3438E489D8BE}"/>
-              </a:ext>
-            </a:extLst>
-          </p:cNvPr>
-          <p:cNvSpPr>
-            <a:spLocks noGrp="1"/>
-          </p:cNvSpPr>
-          <p:nvPr>
-            <p:ph idx="1"/>
-          </p:nvPr>
-        </p:nvSpPr>
-        <p:spPr/>
-        <p:txBody>
-          <a:bodyPr/>
-          <a:lstStyle/>
-          <a:p>
-            <a:endParaRPr lang="en-US"/>
+              <a:t>Distribution of S</a:t>
+            </a:r>
           </a:p>
         </p:txBody>
       </p:sp>
       <p:pic>
         <p:nvPicPr>
-          <p:cNvPr id="4" name="Picture 3">
-            <a:extLst>
-              <a:ext uri="{FF2B5EF4-FFF2-40B4-BE49-F238E27FC236}">
-                <a16:creationId xmlns:a16="http://schemas.microsoft.com/office/drawing/2014/main" id="{9EAE834B-342F-1C4B-8FB0-8DBEDB3C5E4D}"/>
+          <p:cNvPr id="4" name="Content Placeholder 3">
+            <a:extLst>
+              <a:ext uri="{FF2B5EF4-FFF2-40B4-BE49-F238E27FC236}">
+                <a16:creationId xmlns:a16="http://schemas.microsoft.com/office/drawing/2014/main" id="{4750CD26-C503-1747-BFE4-5CABF2D01321}"/>
               </a:ext>
             </a:extLst>
           </p:cNvPr>
           <p:cNvPicPr>
-            <a:picLocks noChangeAspect="1"/>
+            <a:picLocks noGrp="1" noChangeAspect="1"/>
           </p:cNvPicPr>
-          <p:nvPr/>
+          <p:nvPr>
+            <p:ph idx="1"/>
+          </p:nvPr>
         </p:nvPicPr>
         <p:blipFill>
           <a:blip r:embed="rId2"/>
@@ -4934,8 +4765,8 @@
         </p:blipFill>
         <p:spPr>
           <a:xfrm>
-            <a:off x="2590800" y="2396066"/>
-            <a:ext cx="7010400" cy="2692400"/>
+            <a:off x="838200" y="2416222"/>
+            <a:ext cx="10515600" cy="3170144"/>
           </a:xfrm>
           <a:prstGeom prst="rect">
             <a:avLst/>
@@ -4945,7 +4776,7 @@
     </p:spTree>
     <p:extLst>
       <p:ext uri="{BB962C8B-B14F-4D97-AF65-F5344CB8AC3E}">
-        <p14:creationId xmlns:p14="http://schemas.microsoft.com/office/powerpoint/2010/main" val="2655206217"/>
+        <p14:creationId xmlns:p14="http://schemas.microsoft.com/office/powerpoint/2010/main" val="4160294345"/>
       </p:ext>
     </p:extLst>
   </p:cSld>
@@ -4977,7 +4808,7 @@
           <p:cNvPr id="2" name="Title 1">
             <a:extLst>
               <a:ext uri="{FF2B5EF4-FFF2-40B4-BE49-F238E27FC236}">
-                <a16:creationId xmlns:a16="http://schemas.microsoft.com/office/drawing/2014/main" id="{0A1A3115-35FC-A940-AEFD-6C4A7C9F75C5}"/>
+                <a16:creationId xmlns:a16="http://schemas.microsoft.com/office/drawing/2014/main" id="{AB4084F0-7616-3841-9F05-97D1A654E86B}"/>
               </a:ext>
             </a:extLst>
           </p:cNvPr>
@@ -4995,49 +4826,26 @@
           <a:p>
             <a:r>
               <a:rPr lang="en-US" dirty="0"/>
-              <a:t>Covariance Matrix: Method 1</a:t>
-            </a:r>
-          </a:p>
-        </p:txBody>
-      </p:sp>
-      <p:sp>
-        <p:nvSpPr>
-          <p:cNvPr id="3" name="Content Placeholder 2">
-            <a:extLst>
-              <a:ext uri="{FF2B5EF4-FFF2-40B4-BE49-F238E27FC236}">
-                <a16:creationId xmlns:a16="http://schemas.microsoft.com/office/drawing/2014/main" id="{9C2246E2-8C1F-234F-8B43-F41A102189B7}"/>
-              </a:ext>
-            </a:extLst>
-          </p:cNvPr>
-          <p:cNvSpPr>
-            <a:spLocks noGrp="1"/>
-          </p:cNvSpPr>
-          <p:nvPr>
-            <p:ph idx="1"/>
-          </p:nvPr>
-        </p:nvSpPr>
-        <p:spPr/>
-        <p:txBody>
-          <a:bodyPr/>
-          <a:lstStyle/>
-          <a:p>
-            <a:endParaRPr lang="en-US"/>
+              <a:t>Wishart Distribution cont.</a:t>
+            </a:r>
           </a:p>
         </p:txBody>
       </p:sp>
       <p:pic>
         <p:nvPicPr>
-          <p:cNvPr id="4" name="Picture 3">
-            <a:extLst>
-              <a:ext uri="{FF2B5EF4-FFF2-40B4-BE49-F238E27FC236}">
-                <a16:creationId xmlns:a16="http://schemas.microsoft.com/office/drawing/2014/main" id="{0DF02BE4-1159-E242-B51D-5CFF88730D0A}"/>
+          <p:cNvPr id="4" name="Content Placeholder 3">
+            <a:extLst>
+              <a:ext uri="{FF2B5EF4-FFF2-40B4-BE49-F238E27FC236}">
+                <a16:creationId xmlns:a16="http://schemas.microsoft.com/office/drawing/2014/main" id="{8371FE91-8873-FE41-BF74-2FA16D16A1CE}"/>
               </a:ext>
             </a:extLst>
           </p:cNvPr>
           <p:cNvPicPr>
-            <a:picLocks noChangeAspect="1"/>
+            <a:picLocks noGrp="1" noChangeAspect="1"/>
           </p:cNvPicPr>
-          <p:nvPr/>
+          <p:nvPr>
+            <p:ph idx="1"/>
+          </p:nvPr>
         </p:nvPicPr>
         <p:blipFill>
           <a:blip r:embed="rId2"/>
@@ -5047,8 +4855,73 @@
         </p:blipFill>
         <p:spPr>
           <a:xfrm>
-            <a:off x="3060700" y="2382044"/>
-            <a:ext cx="6070600" cy="3238500"/>
+            <a:off x="2075198" y="1690688"/>
+            <a:ext cx="7861300" cy="1638300"/>
+          </a:xfrm>
+          <a:prstGeom prst="rect">
+            <a:avLst/>
+          </a:prstGeom>
+        </p:spPr>
+      </p:pic>
+      <p:sp>
+        <p:nvSpPr>
+          <p:cNvPr id="5" name="TextBox 4">
+            <a:extLst>
+              <a:ext uri="{FF2B5EF4-FFF2-40B4-BE49-F238E27FC236}">
+                <a16:creationId xmlns:a16="http://schemas.microsoft.com/office/drawing/2014/main" id="{FB1F1252-DFF1-9746-BA58-6C0172344D60}"/>
+              </a:ext>
+            </a:extLst>
+          </p:cNvPr>
+          <p:cNvSpPr txBox="1"/>
+          <p:nvPr/>
+        </p:nvSpPr>
+        <p:spPr>
+          <a:xfrm>
+            <a:off x="1223493" y="4005330"/>
+            <a:ext cx="3962175" cy="369332"/>
+          </a:xfrm>
+          <a:prstGeom prst="rect">
+            <a:avLst/>
+          </a:prstGeom>
+          <a:noFill/>
+        </p:spPr>
+        <p:txBody>
+          <a:bodyPr wrap="none" rtlCol="0">
+            <a:spAutoFit/>
+          </a:bodyPr>
+          <a:lstStyle/>
+          <a:p>
+            <a:r>
+              <a:rPr lang="en-US" dirty="0"/>
+              <a:t>Similar to a Chi square in univariate case</a:t>
+            </a:r>
+          </a:p>
+        </p:txBody>
+      </p:sp>
+      <p:pic>
+        <p:nvPicPr>
+          <p:cNvPr id="6" name="Picture 5">
+            <a:extLst>
+              <a:ext uri="{FF2B5EF4-FFF2-40B4-BE49-F238E27FC236}">
+                <a16:creationId xmlns:a16="http://schemas.microsoft.com/office/drawing/2014/main" id="{1631D6E9-3B4E-5F45-A63E-1231518DE9DD}"/>
+              </a:ext>
+            </a:extLst>
+          </p:cNvPr>
+          <p:cNvPicPr>
+            <a:picLocks noChangeAspect="1"/>
+          </p:cNvPicPr>
+          <p:nvPr/>
+        </p:nvPicPr>
+        <p:blipFill>
+          <a:blip r:embed="rId3"/>
+          <a:stretch>
+            <a:fillRect/>
+          </a:stretch>
+        </p:blipFill>
+        <p:spPr>
+          <a:xfrm>
+            <a:off x="2303798" y="4374662"/>
+            <a:ext cx="7632700" cy="1981200"/>
           </a:xfrm>
           <a:prstGeom prst="rect">
             <a:avLst/>
@@ -5058,7 +4931,7 @@
     </p:spTree>
     <p:extLst>
       <p:ext uri="{BB962C8B-B14F-4D97-AF65-F5344CB8AC3E}">
-        <p14:creationId xmlns:p14="http://schemas.microsoft.com/office/powerpoint/2010/main" val="3675788514"/>
+        <p14:creationId xmlns:p14="http://schemas.microsoft.com/office/powerpoint/2010/main" val="3524516759"/>
       </p:ext>
     </p:extLst>
   </p:cSld>
@@ -5087,10 +4960,10 @@
       </p:grpSpPr>
       <p:sp>
         <p:nvSpPr>
-          <p:cNvPr id="4" name="Title 3">
-            <a:extLst>
-              <a:ext uri="{FF2B5EF4-FFF2-40B4-BE49-F238E27FC236}">
-                <a16:creationId xmlns:a16="http://schemas.microsoft.com/office/drawing/2014/main" id="{8FA3C071-7886-D248-AF44-FC776C8B991E}"/>
+          <p:cNvPr id="2" name="Title 1">
+            <a:extLst>
+              <a:ext uri="{FF2B5EF4-FFF2-40B4-BE49-F238E27FC236}">
+                <a16:creationId xmlns:a16="http://schemas.microsoft.com/office/drawing/2014/main" id="{BD5803CC-6D68-7848-913E-AC49F6173070}"/>
               </a:ext>
             </a:extLst>
           </p:cNvPr>
@@ -5108,17 +4981,17 @@
           <a:p>
             <a:r>
               <a:rPr lang="en-US" dirty="0"/>
-              <a:t>Univariate Statistics</a:t>
-            </a:r>
-          </a:p>
-        </p:txBody>
-      </p:sp>
-      <p:sp>
-        <p:nvSpPr>
-          <p:cNvPr id="5" name="Text Placeholder 4">
-            <a:extLst>
-              <a:ext uri="{FF2B5EF4-FFF2-40B4-BE49-F238E27FC236}">
-                <a16:creationId xmlns:a16="http://schemas.microsoft.com/office/drawing/2014/main" id="{5B20AA4A-0A22-C043-A085-BFFAE61C8CB9}"/>
+              <a:t>Multivariate Normal Density Function</a:t>
+            </a:r>
+          </a:p>
+        </p:txBody>
+      </p:sp>
+      <p:sp>
+        <p:nvSpPr>
+          <p:cNvPr id="4" name="Text Placeholder 3">
+            <a:extLst>
+              <a:ext uri="{FF2B5EF4-FFF2-40B4-BE49-F238E27FC236}">
+                <a16:creationId xmlns:a16="http://schemas.microsoft.com/office/drawing/2014/main" id="{94E8AF97-AD1C-DD49-95E8-810368B8AA92}"/>
               </a:ext>
             </a:extLst>
           </p:cNvPr>
@@ -5141,7 +5014,7 @@
     </p:spTree>
     <p:extLst>
       <p:ext uri="{BB962C8B-B14F-4D97-AF65-F5344CB8AC3E}">
-        <p14:creationId xmlns:p14="http://schemas.microsoft.com/office/powerpoint/2010/main" val="2702276110"/>
+        <p14:creationId xmlns:p14="http://schemas.microsoft.com/office/powerpoint/2010/main" val="1712216404"/>
       </p:ext>
     </p:extLst>
   </p:cSld>
@@ -5173,7 +5046,7 @@
           <p:cNvPr id="2" name="Title 1">
             <a:extLst>
               <a:ext uri="{FF2B5EF4-FFF2-40B4-BE49-F238E27FC236}">
-                <a16:creationId xmlns:a16="http://schemas.microsoft.com/office/drawing/2014/main" id="{680CF148-594C-C14F-A3FA-58798598E903}"/>
+                <a16:creationId xmlns:a16="http://schemas.microsoft.com/office/drawing/2014/main" id="{A5E06EFC-516B-7B4E-A0F0-83220C3B3C98}"/>
               </a:ext>
             </a:extLst>
           </p:cNvPr>
@@ -5191,70 +5064,40 @@
           <a:p>
             <a:r>
               <a:rPr lang="en-US" dirty="0"/>
-              <a:t>Covariance Matrix: Method 2</a:t>
-            </a:r>
-          </a:p>
-        </p:txBody>
-      </p:sp>
-      <p:sp>
-        <p:nvSpPr>
-          <p:cNvPr id="3" name="Content Placeholder 2">
-            <a:extLst>
-              <a:ext uri="{FF2B5EF4-FFF2-40B4-BE49-F238E27FC236}">
-                <a16:creationId xmlns:a16="http://schemas.microsoft.com/office/drawing/2014/main" id="{88D814C4-4474-2E41-A9DF-CA27036328E2}"/>
-              </a:ext>
-            </a:extLst>
-          </p:cNvPr>
-          <p:cNvSpPr>
-            <a:spLocks noGrp="1"/>
-          </p:cNvSpPr>
-          <p:nvPr>
-            <p:ph idx="1"/>
-          </p:nvPr>
-        </p:nvSpPr>
-        <p:spPr/>
-        <p:txBody>
-          <a:bodyPr/>
-          <a:lstStyle/>
-          <a:p>
-            <a:endParaRPr lang="en-US" dirty="0"/>
-          </a:p>
-        </p:txBody>
-      </p:sp>
-      <p:pic>
-        <p:nvPicPr>
-          <p:cNvPr id="4" name="Picture 3">
-            <a:extLst>
-              <a:ext uri="{FF2B5EF4-FFF2-40B4-BE49-F238E27FC236}">
-                <a16:creationId xmlns:a16="http://schemas.microsoft.com/office/drawing/2014/main" id="{DDCFFFBD-17D7-AD47-BCB2-6ED46B1AB219}"/>
-              </a:ext>
-            </a:extLst>
-          </p:cNvPr>
-          <p:cNvPicPr>
-            <a:picLocks noChangeAspect="1"/>
-          </p:cNvPicPr>
-          <p:nvPr/>
-        </p:nvPicPr>
-        <p:blipFill>
-          <a:blip r:embed="rId2"/>
-          <a:stretch>
-            <a:fillRect/>
-          </a:stretch>
-        </p:blipFill>
-        <p:spPr>
-          <a:xfrm>
-            <a:off x="2800350" y="2559844"/>
-            <a:ext cx="6591300" cy="2882900"/>
-          </a:xfrm>
-          <a:prstGeom prst="rect">
-            <a:avLst/>
-          </a:prstGeom>
-        </p:spPr>
-      </p:pic>
+              <a:t>Assessing Multivariate Normality</a:t>
+            </a:r>
+          </a:p>
+        </p:txBody>
+      </p:sp>
+      <p:sp>
+        <p:nvSpPr>
+          <p:cNvPr id="4" name="Text Placeholder 3">
+            <a:extLst>
+              <a:ext uri="{FF2B5EF4-FFF2-40B4-BE49-F238E27FC236}">
+                <a16:creationId xmlns:a16="http://schemas.microsoft.com/office/drawing/2014/main" id="{5C77EB7F-A5C1-A34A-B6BD-144BEB8DAB7E}"/>
+              </a:ext>
+            </a:extLst>
+          </p:cNvPr>
+          <p:cNvSpPr>
+            <a:spLocks noGrp="1"/>
+          </p:cNvSpPr>
+          <p:nvPr>
+            <p:ph type="body" idx="1"/>
+          </p:nvPr>
+        </p:nvSpPr>
+        <p:spPr/>
+        <p:txBody>
+          <a:bodyPr/>
+          <a:lstStyle/>
+          <a:p>
+            <a:endParaRPr lang="en-US"/>
+          </a:p>
+        </p:txBody>
+      </p:sp>
     </p:spTree>
     <p:extLst>
       <p:ext uri="{BB962C8B-B14F-4D97-AF65-F5344CB8AC3E}">
-        <p14:creationId xmlns:p14="http://schemas.microsoft.com/office/powerpoint/2010/main" val="3574216204"/>
+        <p14:creationId xmlns:p14="http://schemas.microsoft.com/office/powerpoint/2010/main" val="606941782"/>
       </p:ext>
     </p:extLst>
   </p:cSld>
@@ -5286,7 +5129,7 @@
           <p:cNvPr id="2" name="Title 1">
             <a:extLst>
               <a:ext uri="{FF2B5EF4-FFF2-40B4-BE49-F238E27FC236}">
-                <a16:creationId xmlns:a16="http://schemas.microsoft.com/office/drawing/2014/main" id="{680CF148-594C-C14F-A3FA-58798598E903}"/>
+                <a16:creationId xmlns:a16="http://schemas.microsoft.com/office/drawing/2014/main" id="{C7DD7FB6-56FB-5C4E-AA3A-EF65F0883EAB}"/>
               </a:ext>
             </a:extLst>
           </p:cNvPr>
@@ -5304,45 +5147,63 @@
           <a:p>
             <a:r>
               <a:rPr lang="en-US" dirty="0"/>
-              <a:t>Covariance Matrix: Method 3</a:t>
-            </a:r>
-          </a:p>
-        </p:txBody>
-      </p:sp>
-      <p:pic>
-        <p:nvPicPr>
-          <p:cNvPr id="5" name="Picture 4">
-            <a:extLst>
-              <a:ext uri="{FF2B5EF4-FFF2-40B4-BE49-F238E27FC236}">
-                <a16:creationId xmlns:a16="http://schemas.microsoft.com/office/drawing/2014/main" id="{DBBF806C-709E-A34D-9A8E-CCCA7878E4BD}"/>
-              </a:ext>
-            </a:extLst>
-          </p:cNvPr>
-          <p:cNvPicPr>
-            <a:picLocks noChangeAspect="1"/>
-          </p:cNvPicPr>
-          <p:nvPr/>
-        </p:nvPicPr>
-        <p:blipFill>
-          <a:blip r:embed="rId2"/>
-          <a:stretch>
-            <a:fillRect/>
-          </a:stretch>
-        </p:blipFill>
-        <p:spPr>
-          <a:xfrm>
-            <a:off x="2393950" y="2095500"/>
-            <a:ext cx="7404100" cy="2667000"/>
-          </a:xfrm>
-          <a:prstGeom prst="rect">
-            <a:avLst/>
-          </a:prstGeom>
-        </p:spPr>
-      </p:pic>
+              <a:t>Investigating Univariate Normality</a:t>
+            </a:r>
+          </a:p>
+        </p:txBody>
+      </p:sp>
+      <p:sp>
+        <p:nvSpPr>
+          <p:cNvPr id="3" name="Content Placeholder 2">
+            <a:extLst>
+              <a:ext uri="{FF2B5EF4-FFF2-40B4-BE49-F238E27FC236}">
+                <a16:creationId xmlns:a16="http://schemas.microsoft.com/office/drawing/2014/main" id="{2C17E05B-FC95-5F44-8522-55C83D83CDE6}"/>
+              </a:ext>
+            </a:extLst>
+          </p:cNvPr>
+          <p:cNvSpPr>
+            <a:spLocks noGrp="1"/>
+          </p:cNvSpPr>
+          <p:nvPr>
+            <p:ph idx="1"/>
+          </p:nvPr>
+        </p:nvSpPr>
+        <p:spPr/>
+        <p:txBody>
+          <a:bodyPr/>
+          <a:lstStyle/>
+          <a:p>
+            <a:r>
+              <a:rPr lang="en-US" dirty="0"/>
+              <a:t>If one of the random variables in a sample is not normal than the collection cannot by multivariate normal.</a:t>
+            </a:r>
+          </a:p>
+          <a:p>
+            <a:r>
+              <a:rPr lang="en-US" dirty="0"/>
+              <a:t>QQ Plots are good</a:t>
+            </a:r>
+          </a:p>
+          <a:p>
+            <a:pPr lvl="1"/>
+            <a:r>
+              <a:rPr lang="en-US" dirty="0"/>
+              <a:t>Sort the values and compare to theoretical quantiles (see R code)</a:t>
+            </a:r>
+          </a:p>
+          <a:p>
+            <a:pPr lvl="1"/>
+            <a:r>
+              <a:rPr lang="en-US" dirty="0"/>
+              <a:t>You don’t have to use the sample mean and standard deviation but it makes reading the curve easier</a:t>
+            </a:r>
+          </a:p>
+        </p:txBody>
+      </p:sp>
     </p:spTree>
     <p:extLst>
       <p:ext uri="{BB962C8B-B14F-4D97-AF65-F5344CB8AC3E}">
-        <p14:creationId xmlns:p14="http://schemas.microsoft.com/office/powerpoint/2010/main" val="1628583122"/>
+        <p14:creationId xmlns:p14="http://schemas.microsoft.com/office/powerpoint/2010/main" val="798469456"/>
       </p:ext>
     </p:extLst>
   </p:cSld>
@@ -5374,7 +5235,7 @@
           <p:cNvPr id="2" name="Title 1">
             <a:extLst>
               <a:ext uri="{FF2B5EF4-FFF2-40B4-BE49-F238E27FC236}">
-                <a16:creationId xmlns:a16="http://schemas.microsoft.com/office/drawing/2014/main" id="{C395E6F7-CB25-2142-A0D5-8E63B1B7EC12}"/>
+                <a16:creationId xmlns:a16="http://schemas.microsoft.com/office/drawing/2014/main" id="{96C8ED4E-E353-B941-9E31-79D6E2F7A867}"/>
               </a:ext>
             </a:extLst>
           </p:cNvPr>
@@ -5392,7 +5253,7 @@
           <a:p>
             <a:r>
               <a:rPr lang="en-US" dirty="0"/>
-              <a:t>Correlation Matrix</a:t>
+              <a:t>Skewness</a:t>
             </a:r>
           </a:p>
         </p:txBody>
@@ -5402,7 +5263,7 @@
           <p:cNvPr id="3" name="Content Placeholder 2">
             <a:extLst>
               <a:ext uri="{FF2B5EF4-FFF2-40B4-BE49-F238E27FC236}">
-                <a16:creationId xmlns:a16="http://schemas.microsoft.com/office/drawing/2014/main" id="{2E3F700F-DEE0-F14B-BB67-564AB59702D3}"/>
+                <a16:creationId xmlns:a16="http://schemas.microsoft.com/office/drawing/2014/main" id="{B502717F-2213-DD4F-B944-08A23B0ABE8B}"/>
               </a:ext>
             </a:extLst>
           </p:cNvPr>
@@ -5418,9 +5279,21 @@
           <a:bodyPr/>
           <a:lstStyle/>
           <a:p>
+            <a:endParaRPr lang="en-US" dirty="0"/>
+          </a:p>
+          <a:p>
+            <a:endParaRPr lang="en-US" dirty="0"/>
+          </a:p>
+          <a:p>
+            <a:endParaRPr lang="en-US" dirty="0"/>
+          </a:p>
+          <a:p>
+            <a:endParaRPr lang="en-US" dirty="0"/>
+          </a:p>
+          <a:p>
             <a:r>
               <a:rPr lang="en-US" dirty="0"/>
-              <a:t>Same idea as the covariance matrix</a:t>
+              <a:t>If Negative then negative skewness</a:t>
             </a:r>
           </a:p>
         </p:txBody>
@@ -5430,7 +5303,7 @@
           <p:cNvPr id="4" name="Picture 3">
             <a:extLst>
               <a:ext uri="{FF2B5EF4-FFF2-40B4-BE49-F238E27FC236}">
-                <a16:creationId xmlns:a16="http://schemas.microsoft.com/office/drawing/2014/main" id="{216B5ACE-C077-5C4F-8747-2CDA9D574625}"/>
+                <a16:creationId xmlns:a16="http://schemas.microsoft.com/office/drawing/2014/main" id="{225559C8-C329-674E-B71A-98ECDB27F33E}"/>
               </a:ext>
             </a:extLst>
           </p:cNvPr>
@@ -5447,8 +5320,38 @@
         </p:blipFill>
         <p:spPr>
           <a:xfrm>
-            <a:off x="2749550" y="2470944"/>
-            <a:ext cx="6692900" cy="3060700"/>
+            <a:off x="838200" y="1825625"/>
+            <a:ext cx="5981700" cy="1803400"/>
+          </a:xfrm>
+          <a:prstGeom prst="rect">
+            <a:avLst/>
+          </a:prstGeom>
+        </p:spPr>
+      </p:pic>
+      <p:pic>
+        <p:nvPicPr>
+          <p:cNvPr id="5" name="Picture 4">
+            <a:extLst>
+              <a:ext uri="{FF2B5EF4-FFF2-40B4-BE49-F238E27FC236}">
+                <a16:creationId xmlns:a16="http://schemas.microsoft.com/office/drawing/2014/main" id="{CE9A9C4F-59FE-3A46-986F-ABB225EC7A1E}"/>
+              </a:ext>
+            </a:extLst>
+          </p:cNvPr>
+          <p:cNvPicPr>
+            <a:picLocks noChangeAspect="1"/>
+          </p:cNvPicPr>
+          <p:nvPr/>
+        </p:nvPicPr>
+        <p:blipFill>
+          <a:blip r:embed="rId3"/>
+          <a:stretch>
+            <a:fillRect/>
+          </a:stretch>
+        </p:blipFill>
+        <p:spPr>
+          <a:xfrm>
+            <a:off x="6932609" y="1954474"/>
+            <a:ext cx="4308481" cy="2949051"/>
           </a:xfrm>
           <a:prstGeom prst="rect">
             <a:avLst/>
@@ -5458,7 +5361,7 @@
     </p:spTree>
     <p:extLst>
       <p:ext uri="{BB962C8B-B14F-4D97-AF65-F5344CB8AC3E}">
-        <p14:creationId xmlns:p14="http://schemas.microsoft.com/office/powerpoint/2010/main" val="4272755765"/>
+        <p14:creationId xmlns:p14="http://schemas.microsoft.com/office/powerpoint/2010/main" val="3975112488"/>
       </p:ext>
     </p:extLst>
   </p:cSld>
@@ -5490,7 +5393,7 @@
           <p:cNvPr id="2" name="Title 1">
             <a:extLst>
               <a:ext uri="{FF2B5EF4-FFF2-40B4-BE49-F238E27FC236}">
-                <a16:creationId xmlns:a16="http://schemas.microsoft.com/office/drawing/2014/main" id="{C94D2261-3655-C34B-B927-4AFC30EF9413}"/>
+                <a16:creationId xmlns:a16="http://schemas.microsoft.com/office/drawing/2014/main" id="{A7437153-4FDC-7A46-8ABA-B02014B13DA6}"/>
               </a:ext>
             </a:extLst>
           </p:cNvPr>
@@ -5508,7 +5411,7 @@
           <a:p>
             <a:r>
               <a:rPr lang="en-US" dirty="0"/>
-              <a:t>Linear Combinations of Variables</a:t>
+              <a:t>Kurtosis</a:t>
             </a:r>
           </a:p>
         </p:txBody>
@@ -5518,7 +5421,7 @@
           <p:cNvPr id="3" name="Content Placeholder 2">
             <a:extLst>
               <a:ext uri="{FF2B5EF4-FFF2-40B4-BE49-F238E27FC236}">
-                <a16:creationId xmlns:a16="http://schemas.microsoft.com/office/drawing/2014/main" id="{2538B13A-FACA-0841-8994-34FDCEA246D6}"/>
+                <a16:creationId xmlns:a16="http://schemas.microsoft.com/office/drawing/2014/main" id="{63A6BCAE-E472-CD42-83AC-7ECFE006F1B6}"/>
               </a:ext>
             </a:extLst>
           </p:cNvPr>
@@ -5534,16 +5437,22 @@
           <a:bodyPr/>
           <a:lstStyle/>
           <a:p>
+            <a:endParaRPr lang="en-US" dirty="0"/>
+          </a:p>
+          <a:p>
+            <a:endParaRPr lang="en-US" dirty="0"/>
+          </a:p>
+          <a:p>
+            <a:endParaRPr lang="en-US" dirty="0"/>
+          </a:p>
+          <a:p>
+            <a:endParaRPr lang="en-US" dirty="0"/>
+          </a:p>
+          <a:p>
             <a:r>
               <a:rPr lang="en-US" dirty="0"/>
-              <a:t>Multiply each y by a coefficients (like in linear regression). Remember a is column vector</a:t>
-            </a:r>
-          </a:p>
-          <a:p>
-            <a:endParaRPr lang="en-US" dirty="0"/>
-          </a:p>
-          <a:p>
-            <a:endParaRPr lang="en-US" dirty="0"/>
+              <a:t>If &lt; 3 then negative kurtosis</a:t>
+            </a:r>
           </a:p>
         </p:txBody>
       </p:sp>
@@ -5552,7 +5461,7 @@
           <p:cNvPr id="4" name="Picture 3">
             <a:extLst>
               <a:ext uri="{FF2B5EF4-FFF2-40B4-BE49-F238E27FC236}">
-                <a16:creationId xmlns:a16="http://schemas.microsoft.com/office/drawing/2014/main" id="{F2C197DF-53B5-4B4C-A267-AEC8D1DE47CD}"/>
+                <a16:creationId xmlns:a16="http://schemas.microsoft.com/office/drawing/2014/main" id="{D22617DB-4E1F-9940-82E2-855CCC0F9A7F}"/>
               </a:ext>
             </a:extLst>
           </p:cNvPr>
@@ -5569,8 +5478,8 @@
         </p:blipFill>
         <p:spPr>
           <a:xfrm>
-            <a:off x="838200" y="2603500"/>
-            <a:ext cx="3873500" cy="1651000"/>
+            <a:off x="838200" y="1690688"/>
+            <a:ext cx="4699000" cy="1625600"/>
           </a:xfrm>
           <a:prstGeom prst="rect">
             <a:avLst/>
@@ -5582,7 +5491,7 @@
           <p:cNvPr id="5" name="Picture 4">
             <a:extLst>
               <a:ext uri="{FF2B5EF4-FFF2-40B4-BE49-F238E27FC236}">
-                <a16:creationId xmlns:a16="http://schemas.microsoft.com/office/drawing/2014/main" id="{0E82D1D1-D64C-C342-93CB-9E6433021E9C}"/>
+                <a16:creationId xmlns:a16="http://schemas.microsoft.com/office/drawing/2014/main" id="{334D43DF-0C35-7943-BBED-F8900CA0501D}"/>
               </a:ext>
             </a:extLst>
           </p:cNvPr>
@@ -5599,8 +5508,8 @@
         </p:blipFill>
         <p:spPr>
           <a:xfrm>
-            <a:off x="5588000" y="2749550"/>
-            <a:ext cx="5384800" cy="1358900"/>
+            <a:off x="5537200" y="1027906"/>
+            <a:ext cx="6472571" cy="4536178"/>
           </a:xfrm>
           <a:prstGeom prst="rect">
             <a:avLst/>
@@ -5610,7 +5519,7 @@
     </p:spTree>
     <p:extLst>
       <p:ext uri="{BB962C8B-B14F-4D97-AF65-F5344CB8AC3E}">
-        <p14:creationId xmlns:p14="http://schemas.microsoft.com/office/powerpoint/2010/main" val="2476823066"/>
+        <p14:creationId xmlns:p14="http://schemas.microsoft.com/office/powerpoint/2010/main" val="2708409083"/>
       </p:ext>
     </p:extLst>
   </p:cSld>
@@ -5642,7 +5551,7 @@
           <p:cNvPr id="2" name="Title 1">
             <a:extLst>
               <a:ext uri="{FF2B5EF4-FFF2-40B4-BE49-F238E27FC236}">
-                <a16:creationId xmlns:a16="http://schemas.microsoft.com/office/drawing/2014/main" id="{8583E020-E603-904E-B474-E55BE1528561}"/>
+                <a16:creationId xmlns:a16="http://schemas.microsoft.com/office/drawing/2014/main" id="{71BEB1EC-B450-3148-B77D-D3E3DB1D4D38}"/>
               </a:ext>
             </a:extLst>
           </p:cNvPr>
@@ -5660,17 +5569,17 @@
           <a:p>
             <a:r>
               <a:rPr lang="en-US" dirty="0"/>
-              <a:t>This can be expanded to lots of different linear combinations</a:t>
-            </a:r>
-          </a:p>
-        </p:txBody>
-      </p:sp>
-      <p:sp>
-        <p:nvSpPr>
-          <p:cNvPr id="6" name="Content Placeholder 5">
-            <a:extLst>
-              <a:ext uri="{FF2B5EF4-FFF2-40B4-BE49-F238E27FC236}">
-                <a16:creationId xmlns:a16="http://schemas.microsoft.com/office/drawing/2014/main" id="{8474686B-3526-164A-9342-6E170DDC79E5}"/>
+              <a:t>Investigating Multivariate Normality</a:t>
+            </a:r>
+          </a:p>
+        </p:txBody>
+      </p:sp>
+      <p:sp>
+        <p:nvSpPr>
+          <p:cNvPr id="3" name="Content Placeholder 2">
+            <a:extLst>
+              <a:ext uri="{FF2B5EF4-FFF2-40B4-BE49-F238E27FC236}">
+                <a16:creationId xmlns:a16="http://schemas.microsoft.com/office/drawing/2014/main" id="{691CF083-5A47-6542-9D3C-AEA9E8E2E2F6}"/>
               </a:ext>
             </a:extLst>
           </p:cNvPr>
@@ -5686,44 +5595,17 @@
           <a:bodyPr/>
           <a:lstStyle/>
           <a:p>
-            <a:endParaRPr lang="en-US" dirty="0"/>
-          </a:p>
-        </p:txBody>
-      </p:sp>
-      <p:pic>
-        <p:nvPicPr>
-          <p:cNvPr id="7" name="Picture 6">
-            <a:extLst>
-              <a:ext uri="{FF2B5EF4-FFF2-40B4-BE49-F238E27FC236}">
-                <a16:creationId xmlns:a16="http://schemas.microsoft.com/office/drawing/2014/main" id="{439FB406-D8E4-0A4A-B714-42C12C8B22AE}"/>
-              </a:ext>
-            </a:extLst>
-          </p:cNvPr>
-          <p:cNvPicPr>
-            <a:picLocks noChangeAspect="1"/>
-          </p:cNvPicPr>
-          <p:nvPr/>
-        </p:nvPicPr>
-        <p:blipFill>
-          <a:blip r:embed="rId2"/>
-          <a:stretch>
-            <a:fillRect/>
-          </a:stretch>
-        </p:blipFill>
-        <p:spPr>
-          <a:xfrm>
-            <a:off x="4240156" y="1825625"/>
-            <a:ext cx="3711687" cy="4442334"/>
-          </a:xfrm>
-          <a:prstGeom prst="rect">
-            <a:avLst/>
-          </a:prstGeom>
-        </p:spPr>
-      </p:pic>
+            <a:r>
+              <a:rPr lang="en-US" dirty="0"/>
+              <a:t>Scatter plots</a:t>
+            </a:r>
+          </a:p>
+        </p:txBody>
+      </p:sp>
     </p:spTree>
     <p:extLst>
       <p:ext uri="{BB962C8B-B14F-4D97-AF65-F5344CB8AC3E}">
-        <p14:creationId xmlns:p14="http://schemas.microsoft.com/office/powerpoint/2010/main" val="3739413478"/>
+        <p14:creationId xmlns:p14="http://schemas.microsoft.com/office/powerpoint/2010/main" val="2568799652"/>
       </p:ext>
     </p:extLst>
   </p:cSld>
@@ -5755,7 +5637,7 @@
           <p:cNvPr id="2" name="Title 1">
             <a:extLst>
               <a:ext uri="{FF2B5EF4-FFF2-40B4-BE49-F238E27FC236}">
-                <a16:creationId xmlns:a16="http://schemas.microsoft.com/office/drawing/2014/main" id="{BC241E7E-841E-2440-8E47-8805B510F657}"/>
+                <a16:creationId xmlns:a16="http://schemas.microsoft.com/office/drawing/2014/main" id="{82D093CE-3554-7A46-9F54-5D53952DA9A8}"/>
               </a:ext>
             </a:extLst>
           </p:cNvPr>
@@ -5773,47 +5655,40 @@
           <a:p>
             <a:r>
               <a:rPr lang="en-US" dirty="0"/>
-              <a:t>Linear Combinations</a:t>
-            </a:r>
-          </a:p>
-        </p:txBody>
-      </p:sp>
-      <p:pic>
-        <p:nvPicPr>
-          <p:cNvPr id="4" name="Content Placeholder 3">
-            <a:extLst>
-              <a:ext uri="{FF2B5EF4-FFF2-40B4-BE49-F238E27FC236}">
-                <a16:creationId xmlns:a16="http://schemas.microsoft.com/office/drawing/2014/main" id="{44870A58-41BD-6747-8F5B-A7E77DC5CA0E}"/>
-              </a:ext>
-            </a:extLst>
-          </p:cNvPr>
-          <p:cNvPicPr>
-            <a:picLocks noGrp="1" noChangeAspect="1"/>
-          </p:cNvPicPr>
-          <p:nvPr>
-            <p:ph idx="1"/>
-          </p:nvPr>
-        </p:nvPicPr>
-        <p:blipFill>
-          <a:blip r:embed="rId2"/>
-          <a:stretch>
-            <a:fillRect/>
-          </a:stretch>
-        </p:blipFill>
-        <p:spPr>
-          <a:xfrm>
-            <a:off x="2938935" y="1825625"/>
-            <a:ext cx="6314130" cy="4351338"/>
-          </a:xfrm>
-          <a:prstGeom prst="rect">
-            <a:avLst/>
-          </a:prstGeom>
-        </p:spPr>
-      </p:pic>
+              <a:t>Transformations to normality</a:t>
+            </a:r>
+          </a:p>
+        </p:txBody>
+      </p:sp>
+      <p:sp>
+        <p:nvSpPr>
+          <p:cNvPr id="4" name="Text Placeholder 3">
+            <a:extLst>
+              <a:ext uri="{FF2B5EF4-FFF2-40B4-BE49-F238E27FC236}">
+                <a16:creationId xmlns:a16="http://schemas.microsoft.com/office/drawing/2014/main" id="{A9D6F458-86FC-7E48-83EF-7C16A73B7187}"/>
+              </a:ext>
+            </a:extLst>
+          </p:cNvPr>
+          <p:cNvSpPr>
+            <a:spLocks noGrp="1"/>
+          </p:cNvSpPr>
+          <p:nvPr>
+            <p:ph type="body" idx="1"/>
+          </p:nvPr>
+        </p:nvSpPr>
+        <p:spPr/>
+        <p:txBody>
+          <a:bodyPr/>
+          <a:lstStyle/>
+          <a:p>
+            <a:endParaRPr lang="en-US"/>
+          </a:p>
+        </p:txBody>
+      </p:sp>
     </p:spTree>
     <p:extLst>
       <p:ext uri="{BB962C8B-B14F-4D97-AF65-F5344CB8AC3E}">
-        <p14:creationId xmlns:p14="http://schemas.microsoft.com/office/powerpoint/2010/main" val="2649873500"/>
+        <p14:creationId xmlns:p14="http://schemas.microsoft.com/office/powerpoint/2010/main" val="1533491086"/>
       </p:ext>
     </p:extLst>
   </p:cSld>
@@ -5845,7 +5720,7 @@
           <p:cNvPr id="2" name="Title 1">
             <a:extLst>
               <a:ext uri="{FF2B5EF4-FFF2-40B4-BE49-F238E27FC236}">
-                <a16:creationId xmlns:a16="http://schemas.microsoft.com/office/drawing/2014/main" id="{84430807-76D3-814F-8E19-EFE51C949CC6}"/>
+                <a16:creationId xmlns:a16="http://schemas.microsoft.com/office/drawing/2014/main" id="{8D93FE84-C106-104F-B15C-42E1BDF9FAB2}"/>
               </a:ext>
             </a:extLst>
           </p:cNvPr>
@@ -5863,41 +5738,77 @@
           <a:p>
             <a:r>
               <a:rPr lang="en-US" dirty="0"/>
-              <a:t>Homework</a:t>
-            </a:r>
-          </a:p>
-        </p:txBody>
-      </p:sp>
-      <p:sp>
-        <p:nvSpPr>
-          <p:cNvPr id="3" name="Content Placeholder 2">
-            <a:extLst>
-              <a:ext uri="{FF2B5EF4-FFF2-40B4-BE49-F238E27FC236}">
-                <a16:creationId xmlns:a16="http://schemas.microsoft.com/office/drawing/2014/main" id="{6B42893F-66A9-2B42-A234-7315A2761C27}"/>
-              </a:ext>
-            </a:extLst>
-          </p:cNvPr>
-          <p:cNvSpPr>
-            <a:spLocks noGrp="1"/>
-          </p:cNvSpPr>
+              <a:t>Box Cox</a:t>
+            </a:r>
+          </a:p>
+        </p:txBody>
+      </p:sp>
+      <p:pic>
+        <p:nvPicPr>
+          <p:cNvPr id="4" name="Content Placeholder 3">
+            <a:extLst>
+              <a:ext uri="{FF2B5EF4-FFF2-40B4-BE49-F238E27FC236}">
+                <a16:creationId xmlns:a16="http://schemas.microsoft.com/office/drawing/2014/main" id="{534245C4-A9D9-5446-BFF1-915202AE46E1}"/>
+              </a:ext>
+            </a:extLst>
+          </p:cNvPr>
+          <p:cNvPicPr>
+            <a:picLocks noGrp="1" noChangeAspect="1"/>
+          </p:cNvPicPr>
           <p:nvPr>
             <p:ph idx="1"/>
           </p:nvPr>
-        </p:nvSpPr>
-        <p:spPr/>
-        <p:txBody>
-          <a:bodyPr/>
-          <a:lstStyle/>
-          <a:p>
-            <a:pPr lvl="1"/>
-            <a:endParaRPr lang="en-US" dirty="0"/>
-          </a:p>
-        </p:txBody>
-      </p:sp>
+        </p:nvPicPr>
+        <p:blipFill>
+          <a:blip r:embed="rId2"/>
+          <a:stretch>
+            <a:fillRect/>
+          </a:stretch>
+        </p:blipFill>
+        <p:spPr>
+          <a:xfrm>
+            <a:off x="838200" y="1638300"/>
+            <a:ext cx="6286500" cy="1790700"/>
+          </a:xfrm>
+          <a:prstGeom prst="rect">
+            <a:avLst/>
+          </a:prstGeom>
+        </p:spPr>
+      </p:pic>
+      <p:pic>
+        <p:nvPicPr>
+          <p:cNvPr id="5" name="Picture 4">
+            <a:extLst>
+              <a:ext uri="{FF2B5EF4-FFF2-40B4-BE49-F238E27FC236}">
+                <a16:creationId xmlns:a16="http://schemas.microsoft.com/office/drawing/2014/main" id="{215F45AB-467B-F543-9D36-25D8D429DACA}"/>
+              </a:ext>
+            </a:extLst>
+          </p:cNvPr>
+          <p:cNvPicPr>
+            <a:picLocks noChangeAspect="1"/>
+          </p:cNvPicPr>
+          <p:nvPr/>
+        </p:nvPicPr>
+        <p:blipFill>
+          <a:blip r:embed="rId3"/>
+          <a:stretch>
+            <a:fillRect/>
+          </a:stretch>
+        </p:blipFill>
+        <p:spPr>
+          <a:xfrm>
+            <a:off x="1212939" y="3252772"/>
+            <a:ext cx="7531815" cy="3306441"/>
+          </a:xfrm>
+          <a:prstGeom prst="rect">
+            <a:avLst/>
+          </a:prstGeom>
+        </p:spPr>
+      </p:pic>
     </p:spTree>
     <p:extLst>
       <p:ext uri="{BB962C8B-B14F-4D97-AF65-F5344CB8AC3E}">
-        <p14:creationId xmlns:p14="http://schemas.microsoft.com/office/powerpoint/2010/main" val="68231401"/>
+        <p14:creationId xmlns:p14="http://schemas.microsoft.com/office/powerpoint/2010/main" val="696616564"/>
       </p:ext>
     </p:extLst>
   </p:cSld>
@@ -5929,248 +5840,6 @@
           <p:cNvPr id="2" name="Title 1">
             <a:extLst>
               <a:ext uri="{FF2B5EF4-FFF2-40B4-BE49-F238E27FC236}">
-                <a16:creationId xmlns:a16="http://schemas.microsoft.com/office/drawing/2014/main" id="{4AA27E22-3E88-A542-8273-48AC1BF77626}"/>
-              </a:ext>
-            </a:extLst>
-          </p:cNvPr>
-          <p:cNvSpPr>
-            <a:spLocks noGrp="1"/>
-          </p:cNvSpPr>
-          <p:nvPr>
-            <p:ph type="title"/>
-          </p:nvPr>
-        </p:nvSpPr>
-        <p:spPr/>
-        <p:txBody>
-          <a:bodyPr/>
-          <a:lstStyle/>
-          <a:p>
-            <a:r>
-              <a:rPr lang="en-US" dirty="0"/>
-              <a:t>Measures of overall variability</a:t>
-            </a:r>
-          </a:p>
-        </p:txBody>
-      </p:sp>
-      <p:pic>
-        <p:nvPicPr>
-          <p:cNvPr id="4" name="Content Placeholder 3">
-            <a:extLst>
-              <a:ext uri="{FF2B5EF4-FFF2-40B4-BE49-F238E27FC236}">
-                <a16:creationId xmlns:a16="http://schemas.microsoft.com/office/drawing/2014/main" id="{3F7832EB-881E-E94E-950B-F1D66145D361}"/>
-              </a:ext>
-            </a:extLst>
-          </p:cNvPr>
-          <p:cNvPicPr>
-            <a:picLocks noGrp="1" noChangeAspect="1"/>
-          </p:cNvPicPr>
-          <p:nvPr>
-            <p:ph idx="1"/>
-          </p:nvPr>
-        </p:nvPicPr>
-        <p:blipFill>
-          <a:blip r:embed="rId2"/>
-          <a:stretch>
-            <a:fillRect/>
-          </a:stretch>
-        </p:blipFill>
-        <p:spPr>
-          <a:xfrm>
-            <a:off x="838200" y="2020094"/>
-            <a:ext cx="6235700" cy="1168400"/>
-          </a:xfrm>
-          <a:prstGeom prst="rect">
-            <a:avLst/>
-          </a:prstGeom>
-        </p:spPr>
-      </p:pic>
-      <p:pic>
-        <p:nvPicPr>
-          <p:cNvPr id="5" name="Picture 4">
-            <a:extLst>
-              <a:ext uri="{FF2B5EF4-FFF2-40B4-BE49-F238E27FC236}">
-                <a16:creationId xmlns:a16="http://schemas.microsoft.com/office/drawing/2014/main" id="{88B6C059-39BA-734E-B4BC-287A36CFBBD4}"/>
-              </a:ext>
-            </a:extLst>
-          </p:cNvPr>
-          <p:cNvPicPr>
-            <a:picLocks noChangeAspect="1"/>
-          </p:cNvPicPr>
-          <p:nvPr/>
-        </p:nvPicPr>
-        <p:blipFill>
-          <a:blip r:embed="rId3"/>
-          <a:stretch>
-            <a:fillRect/>
-          </a:stretch>
-        </p:blipFill>
-        <p:spPr>
-          <a:xfrm>
-            <a:off x="931333" y="3758407"/>
-            <a:ext cx="9144000" cy="876300"/>
-          </a:xfrm>
-          <a:prstGeom prst="rect">
-            <a:avLst/>
-          </a:prstGeom>
-        </p:spPr>
-      </p:pic>
-    </p:spTree>
-    <p:extLst>
-      <p:ext uri="{BB962C8B-B14F-4D97-AF65-F5344CB8AC3E}">
-        <p14:creationId xmlns:p14="http://schemas.microsoft.com/office/powerpoint/2010/main" val="688203078"/>
-      </p:ext>
-    </p:extLst>
-  </p:cSld>
-  <p:clrMapOvr>
-    <a:masterClrMapping/>
-  </p:clrMapOvr>
-</p:sld>
-</file>
-
-<file path=ppt/slides/slide28.xml><?xml version="1.0" encoding="utf-8"?>
-<p:sld xmlns:a="http://schemas.openxmlformats.org/drawingml/2006/main" xmlns:r="http://schemas.openxmlformats.org/officeDocument/2006/relationships" xmlns:p="http://schemas.openxmlformats.org/presentationml/2006/main">
-  <p:cSld>
-    <p:spTree>
-      <p:nvGrpSpPr>
-        <p:cNvPr id="1" name=""/>
-        <p:cNvGrpSpPr/>
-        <p:nvPr/>
-      </p:nvGrpSpPr>
-      <p:grpSpPr>
-        <a:xfrm>
-          <a:off x="0" y="0"/>
-          <a:ext cx="0" cy="0"/>
-          <a:chOff x="0" y="0"/>
-          <a:chExt cx="0" cy="0"/>
-        </a:xfrm>
-      </p:grpSpPr>
-      <p:sp>
-        <p:nvSpPr>
-          <p:cNvPr id="2" name="Title 1">
-            <a:extLst>
-              <a:ext uri="{FF2B5EF4-FFF2-40B4-BE49-F238E27FC236}">
-                <a16:creationId xmlns:a16="http://schemas.microsoft.com/office/drawing/2014/main" id="{6659F771-2170-894B-A1F3-8F5CC37007EF}"/>
-              </a:ext>
-            </a:extLst>
-          </p:cNvPr>
-          <p:cNvSpPr>
-            <a:spLocks noGrp="1"/>
-          </p:cNvSpPr>
-          <p:nvPr>
-            <p:ph type="title"/>
-          </p:nvPr>
-        </p:nvSpPr>
-        <p:spPr/>
-        <p:txBody>
-          <a:bodyPr/>
-          <a:lstStyle/>
-          <a:p>
-            <a:r>
-              <a:rPr lang="en-US" dirty="0"/>
-              <a:t>Missing Values</a:t>
-            </a:r>
-          </a:p>
-        </p:txBody>
-      </p:sp>
-      <p:sp>
-        <p:nvSpPr>
-          <p:cNvPr id="3" name="Content Placeholder 2">
-            <a:extLst>
-              <a:ext uri="{FF2B5EF4-FFF2-40B4-BE49-F238E27FC236}">
-                <a16:creationId xmlns:a16="http://schemas.microsoft.com/office/drawing/2014/main" id="{BD5A2A5D-7162-8D42-81D3-834FEB909929}"/>
-              </a:ext>
-            </a:extLst>
-          </p:cNvPr>
-          <p:cNvSpPr>
-            <a:spLocks noGrp="1"/>
-          </p:cNvSpPr>
-          <p:nvPr>
-            <p:ph idx="1"/>
-          </p:nvPr>
-        </p:nvSpPr>
-        <p:spPr/>
-        <p:txBody>
-          <a:bodyPr/>
-          <a:lstStyle/>
-          <a:p>
-            <a:r>
-              <a:rPr lang="en-US" dirty="0"/>
-              <a:t>You can fill in the holes by:</a:t>
-            </a:r>
-          </a:p>
-          <a:p>
-            <a:pPr lvl="1"/>
-            <a:r>
-              <a:rPr lang="en-US" dirty="0"/>
-              <a:t>Column mean</a:t>
-            </a:r>
-          </a:p>
-          <a:p>
-            <a:pPr lvl="1"/>
-            <a:r>
-              <a:rPr lang="en-US" dirty="0"/>
-              <a:t>Regression</a:t>
-            </a:r>
-          </a:p>
-          <a:p>
-            <a:pPr lvl="1"/>
-            <a:endParaRPr lang="en-US" dirty="0"/>
-          </a:p>
-          <a:p>
-            <a:r>
-              <a:rPr lang="en-US" dirty="0"/>
-              <a:t>This is a very involved topic - see the `mice` package in R</a:t>
-            </a:r>
-          </a:p>
-          <a:p>
-            <a:pPr lvl="1"/>
-            <a:r>
-              <a:rPr lang="en-US" dirty="0"/>
-              <a:t>For example – why just linear </a:t>
-            </a:r>
-            <a:r>
-              <a:rPr lang="en-US"/>
-              <a:t>regression?</a:t>
-            </a:r>
-            <a:endParaRPr lang="en-US" dirty="0"/>
-          </a:p>
-        </p:txBody>
-      </p:sp>
-    </p:spTree>
-    <p:extLst>
-      <p:ext uri="{BB962C8B-B14F-4D97-AF65-F5344CB8AC3E}">
-        <p14:creationId xmlns:p14="http://schemas.microsoft.com/office/powerpoint/2010/main" val="2129997036"/>
-      </p:ext>
-    </p:extLst>
-  </p:cSld>
-  <p:clrMapOvr>
-    <a:masterClrMapping/>
-  </p:clrMapOvr>
-</p:sld>
-</file>
-
-<file path=ppt/slides/slide29.xml><?xml version="1.0" encoding="utf-8"?>
-<p:sld xmlns:a="http://schemas.openxmlformats.org/drawingml/2006/main" xmlns:r="http://schemas.openxmlformats.org/officeDocument/2006/relationships" xmlns:p="http://schemas.openxmlformats.org/presentationml/2006/main">
-  <p:cSld>
-    <p:spTree>
-      <p:nvGrpSpPr>
-        <p:cNvPr id="1" name=""/>
-        <p:cNvGrpSpPr/>
-        <p:nvPr/>
-      </p:nvGrpSpPr>
-      <p:grpSpPr>
-        <a:xfrm>
-          <a:off x="0" y="0"/>
-          <a:ext cx="0" cy="0"/>
-          <a:chOff x="0" y="0"/>
-          <a:chExt cx="0" cy="0"/>
-        </a:xfrm>
-      </p:grpSpPr>
-      <p:sp>
-        <p:nvSpPr>
-          <p:cNvPr id="2" name="Title 1">
-            <a:extLst>
-              <a:ext uri="{FF2B5EF4-FFF2-40B4-BE49-F238E27FC236}">
                 <a16:creationId xmlns:a16="http://schemas.microsoft.com/office/drawing/2014/main" id="{E4C04FE5-9BF1-3A4B-90E4-0A079B084369}"/>
               </a:ext>
             </a:extLst>
@@ -6217,17 +5886,20 @@
           <a:p>
             <a:r>
               <a:rPr lang="en-US" dirty="0"/>
-              <a:t>Read chapter 3 of MMA</a:t>
+              <a:t>4.10</a:t>
             </a:r>
           </a:p>
           <a:p>
             <a:r>
               <a:rPr lang="en-US" dirty="0"/>
-              <a:t>Read chapter 2 of Applied Multivariate Analysis</a:t>
-            </a:r>
-          </a:p>
-          <a:p>
-            <a:endParaRPr lang="en-US" dirty="0"/>
+              <a:t>4.19</a:t>
+            </a:r>
+          </a:p>
+          <a:p>
+            <a:r>
+              <a:rPr lang="en-US" dirty="0"/>
+              <a:t>4.26</a:t>
+            </a:r>
           </a:p>
           <a:p>
             <a:endParaRPr lang="en-US" dirty="0"/>
@@ -6266,10 +5938,10 @@
       </p:grpSpPr>
       <p:sp>
         <p:nvSpPr>
-          <p:cNvPr id="4" name="Title 3">
-            <a:extLst>
-              <a:ext uri="{FF2B5EF4-FFF2-40B4-BE49-F238E27FC236}">
-                <a16:creationId xmlns:a16="http://schemas.microsoft.com/office/drawing/2014/main" id="{983CF2E0-3B22-6348-A541-69E6692B5572}"/>
+          <p:cNvPr id="2" name="Title 1">
+            <a:extLst>
+              <a:ext uri="{FF2B5EF4-FFF2-40B4-BE49-F238E27FC236}">
+                <a16:creationId xmlns:a16="http://schemas.microsoft.com/office/drawing/2014/main" id="{C2AA0D9A-AF3D-5E40-933D-D8A80C49C6A7}"/>
               </a:ext>
             </a:extLst>
           </p:cNvPr>
@@ -6287,17 +5959,17 @@
           <a:p>
             <a:r>
               <a:rPr lang="en-US" dirty="0"/>
-              <a:t>Sample Mean</a:t>
-            </a:r>
-          </a:p>
-        </p:txBody>
-      </p:sp>
-      <p:sp>
-        <p:nvSpPr>
-          <p:cNvPr id="5" name="Content Placeholder 4">
-            <a:extLst>
-              <a:ext uri="{FF2B5EF4-FFF2-40B4-BE49-F238E27FC236}">
-                <a16:creationId xmlns:a16="http://schemas.microsoft.com/office/drawing/2014/main" id="{913E3B40-442B-F141-B41F-09626E215DC7}"/>
+              <a:t>Features of MVN Density Function</a:t>
+            </a:r>
+          </a:p>
+        </p:txBody>
+      </p:sp>
+      <p:sp>
+        <p:nvSpPr>
+          <p:cNvPr id="3" name="Content Placeholder 2">
+            <a:extLst>
+              <a:ext uri="{FF2B5EF4-FFF2-40B4-BE49-F238E27FC236}">
+                <a16:creationId xmlns:a16="http://schemas.microsoft.com/office/drawing/2014/main" id="{9C2262C7-7458-EB48-A479-3A79A86BE906}"/>
               </a:ext>
             </a:extLst>
           </p:cNvPr>
@@ -6308,117 +5980,55 @@
             <p:ph idx="1"/>
           </p:nvPr>
         </p:nvSpPr>
-        <p:spPr>
-          <a:xfrm>
-            <a:off x="6333067" y="1690688"/>
-            <a:ext cx="5088466" cy="4351338"/>
-          </a:xfrm>
-        </p:spPr>
+        <p:spPr/>
         <p:txBody>
           <a:bodyPr/>
           <a:lstStyle/>
           <a:p>
             <a:r>
               <a:rPr lang="en-US" dirty="0"/>
-              <a:t>Transformation</a:t>
-            </a:r>
-          </a:p>
-        </p:txBody>
-      </p:sp>
-      <p:pic>
-        <p:nvPicPr>
-          <p:cNvPr id="6" name="Picture 5">
-            <a:extLst>
-              <a:ext uri="{FF2B5EF4-FFF2-40B4-BE49-F238E27FC236}">
-                <a16:creationId xmlns:a16="http://schemas.microsoft.com/office/drawing/2014/main" id="{D0D200EC-FE13-6040-96D7-A833FA171D10}"/>
-              </a:ext>
-            </a:extLst>
-          </p:cNvPr>
-          <p:cNvPicPr>
-            <a:picLocks noChangeAspect="1"/>
-          </p:cNvPicPr>
-          <p:nvPr/>
-        </p:nvPicPr>
-        <p:blipFill>
-          <a:blip r:embed="rId2"/>
-          <a:stretch>
-            <a:fillRect/>
-          </a:stretch>
-        </p:blipFill>
-        <p:spPr>
-          <a:xfrm>
-            <a:off x="901700" y="2330450"/>
-            <a:ext cx="3479800" cy="2197100"/>
-          </a:xfrm>
-          <a:prstGeom prst="rect">
-            <a:avLst/>
-          </a:prstGeom>
-        </p:spPr>
-      </p:pic>
-      <p:pic>
-        <p:nvPicPr>
-          <p:cNvPr id="9" name="Picture 8">
-            <a:extLst>
-              <a:ext uri="{FF2B5EF4-FFF2-40B4-BE49-F238E27FC236}">
-                <a16:creationId xmlns:a16="http://schemas.microsoft.com/office/drawing/2014/main" id="{F8E336C9-F8EE-294E-9201-FEFE0B364BD4}"/>
-              </a:ext>
-            </a:extLst>
-          </p:cNvPr>
-          <p:cNvPicPr>
-            <a:picLocks noChangeAspect="1"/>
-          </p:cNvPicPr>
-          <p:nvPr/>
-        </p:nvPicPr>
-        <p:blipFill>
-          <a:blip r:embed="rId3"/>
-          <a:stretch>
-            <a:fillRect/>
-          </a:stretch>
-        </p:blipFill>
-        <p:spPr>
-          <a:xfrm>
-            <a:off x="6333067" y="2209007"/>
-            <a:ext cx="5410200" cy="1104900"/>
-          </a:xfrm>
-          <a:prstGeom prst="rect">
-            <a:avLst/>
-          </a:prstGeom>
-        </p:spPr>
-      </p:pic>
-      <p:pic>
-        <p:nvPicPr>
-          <p:cNvPr id="10" name="Picture 9">
-            <a:extLst>
-              <a:ext uri="{FF2B5EF4-FFF2-40B4-BE49-F238E27FC236}">
-                <a16:creationId xmlns:a16="http://schemas.microsoft.com/office/drawing/2014/main" id="{6C41F37F-BABE-4940-A4CE-5A7D901C7C4D}"/>
-              </a:ext>
-            </a:extLst>
-          </p:cNvPr>
-          <p:cNvPicPr>
-            <a:picLocks noChangeAspect="1"/>
-          </p:cNvPicPr>
-          <p:nvPr/>
-        </p:nvPicPr>
-        <p:blipFill>
-          <a:blip r:embed="rId4"/>
-          <a:stretch>
-            <a:fillRect/>
-          </a:stretch>
-        </p:blipFill>
-        <p:spPr>
-          <a:xfrm>
-            <a:off x="6333067" y="3600187"/>
-            <a:ext cx="2311400" cy="1206500"/>
-          </a:xfrm>
-          <a:prstGeom prst="rect">
-            <a:avLst/>
-          </a:prstGeom>
-        </p:spPr>
-      </p:pic>
+              <a:t>Distribution can be completely described using only means, variances and covariances (covariance matrix)</a:t>
+            </a:r>
+          </a:p>
+          <a:p>
+            <a:r>
+              <a:rPr lang="en-US" dirty="0"/>
+              <a:t>Bivariate plots show linear trends</a:t>
+            </a:r>
+          </a:p>
+          <a:p>
+            <a:r>
+              <a:rPr lang="en-US" dirty="0"/>
+              <a:t>If variables are uncorrelated they are independent</a:t>
+            </a:r>
+          </a:p>
+          <a:p>
+            <a:pPr lvl="1"/>
+            <a:r>
+              <a:rPr lang="en-US" dirty="0"/>
+              <a:t>Why is this the case and how is it different than what we said before</a:t>
+            </a:r>
+          </a:p>
+          <a:p>
+            <a:r>
+              <a:rPr lang="en-US" dirty="0"/>
+              <a:t>Even when the data are not multivariate normal – the </a:t>
+            </a:r>
+            <a:r>
+              <a:rPr lang="en-US" dirty="0" err="1"/>
+              <a:t>mvn</a:t>
+            </a:r>
+            <a:r>
+              <a:rPr lang="en-US" dirty="0"/>
+              <a:t> normal may serve as a useful approximation by the central limit theorem</a:t>
+            </a:r>
+          </a:p>
+        </p:txBody>
+      </p:sp>
     </p:spTree>
     <p:extLst>
       <p:ext uri="{BB962C8B-B14F-4D97-AF65-F5344CB8AC3E}">
-        <p14:creationId xmlns:p14="http://schemas.microsoft.com/office/powerpoint/2010/main" val="2406382687"/>
+        <p14:creationId xmlns:p14="http://schemas.microsoft.com/office/powerpoint/2010/main" val="2796540221"/>
       </p:ext>
     </p:extLst>
   </p:cSld>
@@ -6450,7 +6060,7 @@
           <p:cNvPr id="2" name="Title 1">
             <a:extLst>
               <a:ext uri="{FF2B5EF4-FFF2-40B4-BE49-F238E27FC236}">
-                <a16:creationId xmlns:a16="http://schemas.microsoft.com/office/drawing/2014/main" id="{CDFA578C-A93D-944E-90E6-873946A650C1}"/>
+                <a16:creationId xmlns:a16="http://schemas.microsoft.com/office/drawing/2014/main" id="{31C89354-12E6-8443-BB1D-C6C4BF55316C}"/>
               </a:ext>
             </a:extLst>
           </p:cNvPr>
@@ -6468,7 +6078,7 @@
           <a:p>
             <a:r>
               <a:rPr lang="en-US" dirty="0"/>
-              <a:t>Sample Variance</a:t>
+              <a:t>Univariate Normal Density and MVN</a:t>
             </a:r>
           </a:p>
         </p:txBody>
@@ -6478,7 +6088,7 @@
           <p:cNvPr id="3" name="Content Placeholder 2">
             <a:extLst>
               <a:ext uri="{FF2B5EF4-FFF2-40B4-BE49-F238E27FC236}">
-                <a16:creationId xmlns:a16="http://schemas.microsoft.com/office/drawing/2014/main" id="{5D66AC73-451B-244F-9A2B-1405EEE4BF95}"/>
+                <a16:creationId xmlns:a16="http://schemas.microsoft.com/office/drawing/2014/main" id="{DCE147F9-CAE8-0F4C-81D7-D2FB2D687589}"/>
               </a:ext>
             </a:extLst>
           </p:cNvPr>
@@ -6489,20 +6099,12 @@
             <p:ph idx="1"/>
           </p:nvPr>
         </p:nvSpPr>
-        <p:spPr>
-          <a:xfrm>
-            <a:off x="6096000" y="1825625"/>
-            <a:ext cx="5257800" cy="4351338"/>
-          </a:xfrm>
-        </p:spPr>
-        <p:txBody>
-          <a:bodyPr/>
-          <a:lstStyle/>
-          <a:p>
-            <a:r>
-              <a:rPr lang="en-US" dirty="0"/>
-              <a:t>Transformation</a:t>
-            </a:r>
+        <p:spPr/>
+        <p:txBody>
+          <a:bodyPr/>
+          <a:lstStyle/>
+          <a:p>
+            <a:endParaRPr lang="en-US"/>
           </a:p>
         </p:txBody>
       </p:sp>
@@ -6511,7 +6113,7 @@
           <p:cNvPr id="4" name="Picture 3">
             <a:extLst>
               <a:ext uri="{FF2B5EF4-FFF2-40B4-BE49-F238E27FC236}">
-                <a16:creationId xmlns:a16="http://schemas.microsoft.com/office/drawing/2014/main" id="{760109F9-DDD2-DD43-A03C-F1D6CFDCD6D4}"/>
+                <a16:creationId xmlns:a16="http://schemas.microsoft.com/office/drawing/2014/main" id="{42A3F867-B8F8-FD48-936C-BCF7EA268CEC}"/>
               </a:ext>
             </a:extLst>
           </p:cNvPr>
@@ -6528,8 +6130,8 @@
         </p:blipFill>
         <p:spPr>
           <a:xfrm>
-            <a:off x="527050" y="1473200"/>
-            <a:ext cx="4584700" cy="1955800"/>
+            <a:off x="1111250" y="2016759"/>
+            <a:ext cx="9969500" cy="1727200"/>
           </a:xfrm>
           <a:prstGeom prst="rect">
             <a:avLst/>
@@ -6541,7 +6143,7 @@
           <p:cNvPr id="5" name="Picture 4">
             <a:extLst>
               <a:ext uri="{FF2B5EF4-FFF2-40B4-BE49-F238E27FC236}">
-                <a16:creationId xmlns:a16="http://schemas.microsoft.com/office/drawing/2014/main" id="{9BCAFCBC-38EE-A044-AC56-FFC651270503}"/>
+                <a16:creationId xmlns:a16="http://schemas.microsoft.com/office/drawing/2014/main" id="{2C81757D-899B-8C4B-AC51-71935A1319B2}"/>
               </a:ext>
             </a:extLst>
           </p:cNvPr>
@@ -6558,68 +6160,8 @@
         </p:blipFill>
         <p:spPr>
           <a:xfrm>
-            <a:off x="501650" y="3429000"/>
-            <a:ext cx="4610100" cy="1981200"/>
-          </a:xfrm>
-          <a:prstGeom prst="rect">
-            <a:avLst/>
-          </a:prstGeom>
-        </p:spPr>
-      </p:pic>
-      <p:pic>
-        <p:nvPicPr>
-          <p:cNvPr id="6" name="Picture 5">
-            <a:extLst>
-              <a:ext uri="{FF2B5EF4-FFF2-40B4-BE49-F238E27FC236}">
-                <a16:creationId xmlns:a16="http://schemas.microsoft.com/office/drawing/2014/main" id="{79CD294C-9307-8641-BD36-BCB52DFE481C}"/>
-              </a:ext>
-            </a:extLst>
-          </p:cNvPr>
-          <p:cNvPicPr>
-            <a:picLocks noChangeAspect="1"/>
-          </p:cNvPicPr>
-          <p:nvPr/>
-        </p:nvPicPr>
-        <p:blipFill>
-          <a:blip r:embed="rId4"/>
-          <a:stretch>
-            <a:fillRect/>
-          </a:stretch>
-        </p:blipFill>
-        <p:spPr>
-          <a:xfrm>
-            <a:off x="6237816" y="2451100"/>
-            <a:ext cx="3340100" cy="762000"/>
-          </a:xfrm>
-          <a:prstGeom prst="rect">
-            <a:avLst/>
-          </a:prstGeom>
-        </p:spPr>
-      </p:pic>
-      <p:pic>
-        <p:nvPicPr>
-          <p:cNvPr id="7" name="Picture 6">
-            <a:extLst>
-              <a:ext uri="{FF2B5EF4-FFF2-40B4-BE49-F238E27FC236}">
-                <a16:creationId xmlns:a16="http://schemas.microsoft.com/office/drawing/2014/main" id="{265500E6-ABF1-2B40-9ED1-E00696AC8220}"/>
-              </a:ext>
-            </a:extLst>
-          </p:cNvPr>
-          <p:cNvPicPr>
-            <a:picLocks noChangeAspect="1"/>
-          </p:cNvPicPr>
-          <p:nvPr/>
-        </p:nvPicPr>
-        <p:blipFill>
-          <a:blip r:embed="rId5"/>
-          <a:stretch>
-            <a:fillRect/>
-          </a:stretch>
-        </p:blipFill>
-        <p:spPr>
-          <a:xfrm>
-            <a:off x="6237816" y="3839104"/>
-            <a:ext cx="2908300" cy="1308100"/>
+            <a:off x="1949450" y="4075891"/>
+            <a:ext cx="8293100" cy="1765300"/>
           </a:xfrm>
           <a:prstGeom prst="rect">
             <a:avLst/>
@@ -6629,7 +6171,7 @@
     </p:spTree>
     <p:extLst>
       <p:ext uri="{BB962C8B-B14F-4D97-AF65-F5344CB8AC3E}">
-        <p14:creationId xmlns:p14="http://schemas.microsoft.com/office/powerpoint/2010/main" val="2896618299"/>
+        <p14:creationId xmlns:p14="http://schemas.microsoft.com/office/powerpoint/2010/main" val="3377098264"/>
       </p:ext>
     </p:extLst>
   </p:cSld>
@@ -6658,10 +6200,10 @@
       </p:grpSpPr>
       <p:sp>
         <p:nvSpPr>
-          <p:cNvPr id="4" name="Title 3">
-            <a:extLst>
-              <a:ext uri="{FF2B5EF4-FFF2-40B4-BE49-F238E27FC236}">
-                <a16:creationId xmlns:a16="http://schemas.microsoft.com/office/drawing/2014/main" id="{25976158-5108-894E-AEDC-BD29B821ED91}"/>
+          <p:cNvPr id="2" name="Title 1">
+            <a:extLst>
+              <a:ext uri="{FF2B5EF4-FFF2-40B4-BE49-F238E27FC236}">
+                <a16:creationId xmlns:a16="http://schemas.microsoft.com/office/drawing/2014/main" id="{15BD09DC-F19E-D34C-8004-DF5EAB49D9A7}"/>
               </a:ext>
             </a:extLst>
           </p:cNvPr>
@@ -6679,40 +6221,136 @@
           <a:p>
             <a:r>
               <a:rPr lang="en-US" dirty="0"/>
-              <a:t>Bivariate Random Variables</a:t>
-            </a:r>
-          </a:p>
-        </p:txBody>
-      </p:sp>
-      <p:sp>
-        <p:nvSpPr>
-          <p:cNvPr id="5" name="Text Placeholder 4">
-            <a:extLst>
-              <a:ext uri="{FF2B5EF4-FFF2-40B4-BE49-F238E27FC236}">
-                <a16:creationId xmlns:a16="http://schemas.microsoft.com/office/drawing/2014/main" id="{4E1E5BBF-89D3-F749-9417-7AB2D0A98740}"/>
-              </a:ext>
-            </a:extLst>
-          </p:cNvPr>
-          <p:cNvSpPr>
-            <a:spLocks noGrp="1"/>
-          </p:cNvSpPr>
-          <p:nvPr>
-            <p:ph type="body" idx="1"/>
-          </p:nvPr>
-        </p:nvSpPr>
-        <p:spPr/>
-        <p:txBody>
-          <a:bodyPr/>
-          <a:lstStyle/>
-          <a:p>
-            <a:endParaRPr lang="en-US"/>
-          </a:p>
-        </p:txBody>
-      </p:sp>
+              <a:t>Generalized Population Variance</a:t>
+            </a:r>
+          </a:p>
+        </p:txBody>
+      </p:sp>
+      <p:sp>
+        <p:nvSpPr>
+          <p:cNvPr id="3" name="Content Placeholder 2">
+            <a:extLst>
+              <a:ext uri="{FF2B5EF4-FFF2-40B4-BE49-F238E27FC236}">
+                <a16:creationId xmlns:a16="http://schemas.microsoft.com/office/drawing/2014/main" id="{59BC9C0E-DF7C-BC4E-9241-8789AA95B164}"/>
+              </a:ext>
+            </a:extLst>
+          </p:cNvPr>
+          <p:cNvSpPr>
+            <a:spLocks noGrp="1"/>
+          </p:cNvSpPr>
+          <p:nvPr>
+            <p:ph idx="1"/>
+          </p:nvPr>
+        </p:nvSpPr>
+        <p:spPr/>
+        <p:txBody>
+          <a:bodyPr/>
+          <a:lstStyle/>
+          <a:p>
+            <a:endParaRPr lang="en-US" dirty="0"/>
+          </a:p>
+          <a:p>
+            <a:endParaRPr lang="en-US" dirty="0"/>
+          </a:p>
+          <a:p>
+            <a:r>
+              <a:rPr lang="en-US" dirty="0"/>
+              <a:t>In the presence of multicollinearity, one or more eigenvalues of </a:t>
+            </a:r>
+            <a:r>
+              <a:rPr lang="el-GR" dirty="0"/>
+              <a:t>Σ </a:t>
+            </a:r>
+            <a:r>
+              <a:rPr lang="en-US" dirty="0"/>
+              <a:t>will be near zero and |</a:t>
+            </a:r>
+            <a:r>
+              <a:rPr lang="el-GR" dirty="0"/>
+              <a:t>Σ| </a:t>
+            </a:r>
+            <a:r>
+              <a:rPr lang="en-US" dirty="0"/>
+              <a:t>will be small, since |</a:t>
+            </a:r>
+            <a:r>
+              <a:rPr lang="el-GR" dirty="0"/>
+              <a:t>Σ| </a:t>
+            </a:r>
+            <a:r>
+              <a:rPr lang="en-US" dirty="0"/>
+              <a:t>is the product of the eigenvalues</a:t>
+            </a:r>
+          </a:p>
+          <a:p>
+            <a:endParaRPr lang="en-US" dirty="0"/>
+          </a:p>
+        </p:txBody>
+      </p:sp>
+      <p:pic>
+        <p:nvPicPr>
+          <p:cNvPr id="4" name="Picture 3">
+            <a:extLst>
+              <a:ext uri="{FF2B5EF4-FFF2-40B4-BE49-F238E27FC236}">
+                <a16:creationId xmlns:a16="http://schemas.microsoft.com/office/drawing/2014/main" id="{ADAB3683-FD57-2E46-944E-A02AAA0DC22E}"/>
+              </a:ext>
+            </a:extLst>
+          </p:cNvPr>
+          <p:cNvPicPr>
+            <a:picLocks noChangeAspect="1"/>
+          </p:cNvPicPr>
+          <p:nvPr/>
+        </p:nvPicPr>
+        <p:blipFill>
+          <a:blip r:embed="rId2"/>
+          <a:stretch>
+            <a:fillRect/>
+          </a:stretch>
+        </p:blipFill>
+        <p:spPr>
+          <a:xfrm>
+            <a:off x="1137227" y="1838094"/>
+            <a:ext cx="7340600" cy="584200"/>
+          </a:xfrm>
+          <a:prstGeom prst="rect">
+            <a:avLst/>
+          </a:prstGeom>
+        </p:spPr>
+      </p:pic>
+      <p:pic>
+        <p:nvPicPr>
+          <p:cNvPr id="5" name="Picture 4">
+            <a:extLst>
+              <a:ext uri="{FF2B5EF4-FFF2-40B4-BE49-F238E27FC236}">
+                <a16:creationId xmlns:a16="http://schemas.microsoft.com/office/drawing/2014/main" id="{C450D299-A08E-ED4D-8E16-0542CCDD4A08}"/>
+              </a:ext>
+            </a:extLst>
+          </p:cNvPr>
+          <p:cNvPicPr>
+            <a:picLocks noChangeAspect="1"/>
+          </p:cNvPicPr>
+          <p:nvPr/>
+        </p:nvPicPr>
+        <p:blipFill>
+          <a:blip r:embed="rId3"/>
+          <a:stretch>
+            <a:fillRect/>
+          </a:stretch>
+        </p:blipFill>
+        <p:spPr>
+          <a:xfrm>
+            <a:off x="2866505" y="4033966"/>
+            <a:ext cx="6458989" cy="2680221"/>
+          </a:xfrm>
+          <a:prstGeom prst="rect">
+            <a:avLst/>
+          </a:prstGeom>
+        </p:spPr>
+      </p:pic>
     </p:spTree>
     <p:extLst>
       <p:ext uri="{BB962C8B-B14F-4D97-AF65-F5344CB8AC3E}">
-        <p14:creationId xmlns:p14="http://schemas.microsoft.com/office/powerpoint/2010/main" val="626309386"/>
+        <p14:creationId xmlns:p14="http://schemas.microsoft.com/office/powerpoint/2010/main" val="364878532"/>
       </p:ext>
     </p:extLst>
   </p:cSld>
@@ -6744,7 +6382,7 @@
           <p:cNvPr id="2" name="Title 1">
             <a:extLst>
               <a:ext uri="{FF2B5EF4-FFF2-40B4-BE49-F238E27FC236}">
-                <a16:creationId xmlns:a16="http://schemas.microsoft.com/office/drawing/2014/main" id="{DC74FB0F-24FD-754D-84FF-A69E875B83E6}"/>
+                <a16:creationId xmlns:a16="http://schemas.microsoft.com/office/drawing/2014/main" id="{6A2643FE-798B-EF45-8B3E-B3357FF71C8C}"/>
               </a:ext>
             </a:extLst>
           </p:cNvPr>
@@ -6762,47 +6400,40 @@
           <a:p>
             <a:r>
               <a:rPr lang="en-US" dirty="0"/>
-              <a:t>Data</a:t>
-            </a:r>
-          </a:p>
-        </p:txBody>
-      </p:sp>
-      <p:pic>
-        <p:nvPicPr>
-          <p:cNvPr id="4" name="Content Placeholder 3">
-            <a:extLst>
-              <a:ext uri="{FF2B5EF4-FFF2-40B4-BE49-F238E27FC236}">
-                <a16:creationId xmlns:a16="http://schemas.microsoft.com/office/drawing/2014/main" id="{0FF9B71A-0937-694D-8CC0-E9B3352E48D9}"/>
-              </a:ext>
-            </a:extLst>
-          </p:cNvPr>
-          <p:cNvPicPr>
-            <a:picLocks noGrp="1" noChangeAspect="1"/>
-          </p:cNvPicPr>
-          <p:nvPr>
-            <p:ph idx="1"/>
-          </p:nvPr>
-        </p:nvPicPr>
-        <p:blipFill>
-          <a:blip r:embed="rId2"/>
-          <a:stretch>
-            <a:fillRect/>
-          </a:stretch>
-        </p:blipFill>
-        <p:spPr>
-          <a:xfrm>
-            <a:off x="3240076" y="1825625"/>
-            <a:ext cx="5711848" cy="4351338"/>
-          </a:xfrm>
-          <a:prstGeom prst="rect">
-            <a:avLst/>
-          </a:prstGeom>
-        </p:spPr>
-      </p:pic>
+              <a:t>Properties of MVN Random Variables</a:t>
+            </a:r>
+          </a:p>
+        </p:txBody>
+      </p:sp>
+      <p:sp>
+        <p:nvSpPr>
+          <p:cNvPr id="4" name="Text Placeholder 3">
+            <a:extLst>
+              <a:ext uri="{FF2B5EF4-FFF2-40B4-BE49-F238E27FC236}">
+                <a16:creationId xmlns:a16="http://schemas.microsoft.com/office/drawing/2014/main" id="{6C2AA439-39E9-EE4F-94C3-5407F1D02E0F}"/>
+              </a:ext>
+            </a:extLst>
+          </p:cNvPr>
+          <p:cNvSpPr>
+            <a:spLocks noGrp="1"/>
+          </p:cNvSpPr>
+          <p:nvPr>
+            <p:ph type="body" idx="1"/>
+          </p:nvPr>
+        </p:nvSpPr>
+        <p:spPr/>
+        <p:txBody>
+          <a:bodyPr/>
+          <a:lstStyle/>
+          <a:p>
+            <a:endParaRPr lang="en-US"/>
+          </a:p>
+        </p:txBody>
+      </p:sp>
     </p:spTree>
     <p:extLst>
       <p:ext uri="{BB962C8B-B14F-4D97-AF65-F5344CB8AC3E}">
-        <p14:creationId xmlns:p14="http://schemas.microsoft.com/office/powerpoint/2010/main" val="333890724"/>
+        <p14:creationId xmlns:p14="http://schemas.microsoft.com/office/powerpoint/2010/main" val="2905818336"/>
       </p:ext>
     </p:extLst>
   </p:cSld>
@@ -6834,7 +6465,7 @@
           <p:cNvPr id="2" name="Title 1">
             <a:extLst>
               <a:ext uri="{FF2B5EF4-FFF2-40B4-BE49-F238E27FC236}">
-                <a16:creationId xmlns:a16="http://schemas.microsoft.com/office/drawing/2014/main" id="{C8EFA18D-5D5A-4B40-95A5-57B9D2704C0E}"/>
+                <a16:creationId xmlns:a16="http://schemas.microsoft.com/office/drawing/2014/main" id="{3F8817D6-5EBC-7346-A8B7-6BBF53F405A9}"/>
               </a:ext>
             </a:extLst>
           </p:cNvPr>
@@ -6852,368 +6483,81 @@
           <a:p>
             <a:r>
               <a:rPr lang="en-US" dirty="0"/>
-              <a:t>Covariance</a:t>
-            </a:r>
-          </a:p>
-        </p:txBody>
-      </p:sp>
-      <p:sp>
-        <p:nvSpPr>
-          <p:cNvPr id="6" name="Content Placeholder 5">
-            <a:extLst>
-              <a:ext uri="{FF2B5EF4-FFF2-40B4-BE49-F238E27FC236}">
-                <a16:creationId xmlns:a16="http://schemas.microsoft.com/office/drawing/2014/main" id="{F6FFDCE2-F330-0A46-B958-CE96F724C692}"/>
-              </a:ext>
-            </a:extLst>
-          </p:cNvPr>
-          <p:cNvSpPr>
-            <a:spLocks noGrp="1"/>
-          </p:cNvSpPr>
+              <a:t>Normality of linear combinations of the variables in </a:t>
+            </a:r>
+            <a:r>
+              <a:rPr lang="en-US" b="1" dirty="0"/>
+              <a:t>y</a:t>
+            </a:r>
+          </a:p>
+        </p:txBody>
+      </p:sp>
+      <p:pic>
+        <p:nvPicPr>
+          <p:cNvPr id="4" name="Content Placeholder 3">
+            <a:extLst>
+              <a:ext uri="{FF2B5EF4-FFF2-40B4-BE49-F238E27FC236}">
+                <a16:creationId xmlns:a16="http://schemas.microsoft.com/office/drawing/2014/main" id="{3C3A3844-0F44-5347-8D27-8B5FE79A2B6F}"/>
+              </a:ext>
+            </a:extLst>
+          </p:cNvPr>
+          <p:cNvPicPr>
+            <a:picLocks noGrp="1" noChangeAspect="1"/>
+          </p:cNvPicPr>
           <p:nvPr>
             <p:ph idx="1"/>
           </p:nvPr>
-        </p:nvSpPr>
+        </p:nvPicPr>
+        <p:blipFill>
+          <a:blip r:embed="rId2"/>
+          <a:stretch>
+            <a:fillRect/>
+          </a:stretch>
+        </p:blipFill>
         <p:spPr>
           <a:xfrm>
-            <a:off x="838200" y="1825625"/>
-            <a:ext cx="10515600" cy="4405842"/>
+            <a:off x="838200" y="2120948"/>
+            <a:ext cx="10515600" cy="2002971"/>
           </a:xfrm>
+          <a:prstGeom prst="rect">
+            <a:avLst/>
+          </a:prstGeom>
         </p:spPr>
-        <p:txBody>
-          <a:bodyPr>
-            <a:normAutofit/>
-          </a:bodyPr>
-          <a:lstStyle/>
-          <a:p>
-            <a:r>
-              <a:rPr lang="en-US" dirty="0"/>
-              <a:t>Generally, if there are two variables measured on the same unit then they tend to </a:t>
-            </a:r>
-            <a:r>
-              <a:rPr lang="en-US" i="1" dirty="0"/>
-              <a:t>covary</a:t>
-            </a:r>
-            <a:r>
-              <a:rPr lang="en-US" dirty="0"/>
-              <a:t>.</a:t>
-            </a:r>
-          </a:p>
-          <a:p>
-            <a:endParaRPr lang="en-US" dirty="0"/>
-          </a:p>
-          <a:p>
-            <a:endParaRPr lang="en-US" dirty="0"/>
-          </a:p>
-          <a:p>
-            <a:endParaRPr lang="en-US" dirty="0"/>
-          </a:p>
-          <a:p>
-            <a:endParaRPr lang="en-US" dirty="0"/>
-          </a:p>
-          <a:p>
-            <a:r>
-              <a:rPr lang="en-US" dirty="0"/>
-              <a:t>What happens if y tends to be above the mean when x is above the mean?</a:t>
-            </a:r>
-          </a:p>
-          <a:p>
-            <a:endParaRPr lang="en-US" dirty="0"/>
-          </a:p>
-        </p:txBody>
-      </p:sp>
-      <mc:AlternateContent xmlns:mc="http://schemas.openxmlformats.org/markup-compatibility/2006" xmlns:a14="http://schemas.microsoft.com/office/drawing/2010/main">
-        <mc:Choice Requires="a14">
-          <p:sp>
-            <p:nvSpPr>
-              <p:cNvPr id="7" name="TextBox 6">
-                <a:extLst>
-                  <a:ext uri="{FF2B5EF4-FFF2-40B4-BE49-F238E27FC236}">
-                    <a16:creationId xmlns:a16="http://schemas.microsoft.com/office/drawing/2014/main" id="{D74C0E0B-8EFD-8F49-A2A5-53B1E127C608}"/>
-                  </a:ext>
-                </a:extLst>
-              </p:cNvPr>
-              <p:cNvSpPr txBox="1"/>
-              <p:nvPr/>
-            </p:nvSpPr>
-            <p:spPr>
-              <a:xfrm>
-                <a:off x="2091267" y="3145717"/>
-                <a:ext cx="7509934" cy="566565"/>
-              </a:xfrm>
-              <a:prstGeom prst="rect">
-                <a:avLst/>
-              </a:prstGeom>
-              <a:noFill/>
-            </p:spPr>
-            <p:txBody>
-              <a:bodyPr wrap="square" lIns="0" tIns="0" rIns="0" bIns="0" rtlCol="0">
-                <a:spAutoFit/>
-              </a:bodyPr>
-              <a:lstStyle/>
-              <a:p>
-                <a:pPr/>
-                <a14:m>
-                  <m:oMathPara xmlns:m="http://schemas.openxmlformats.org/officeDocument/2006/math">
-                    <m:oMathParaPr>
-                      <m:jc m:val="centerGroup"/>
-                    </m:oMathParaPr>
-                    <m:oMath xmlns:m="http://schemas.openxmlformats.org/officeDocument/2006/math">
-                      <m:r>
-                        <a:rPr lang="en-US" sz="3200" b="0" i="1" smtClean="0">
-                          <a:latin typeface="Cambria Math" panose="02040503050406030204" pitchFamily="18" charset="0"/>
-                        </a:rPr>
-                        <m:t>𝑐𝑜𝑣</m:t>
-                      </m:r>
-                      <m:d>
-                        <m:dPr>
-                          <m:ctrlPr>
-                            <a:rPr lang="en-US" sz="3200" b="0" i="1" smtClean="0">
-                              <a:latin typeface="Cambria Math" panose="02040503050406030204" pitchFamily="18" charset="0"/>
-                            </a:rPr>
-                          </m:ctrlPr>
-                        </m:dPr>
-                        <m:e>
-                          <m:r>
-                            <a:rPr lang="en-US" sz="3200" b="0" i="1" smtClean="0">
-                              <a:latin typeface="Cambria Math" panose="02040503050406030204" pitchFamily="18" charset="0"/>
-                            </a:rPr>
-                            <m:t>𝑥</m:t>
-                          </m:r>
-                          <m:r>
-                            <a:rPr lang="en-US" sz="3200" b="0" i="1" smtClean="0">
-                              <a:latin typeface="Cambria Math" panose="02040503050406030204" pitchFamily="18" charset="0"/>
-                            </a:rPr>
-                            <m:t>, </m:t>
-                          </m:r>
-                          <m:r>
-                            <a:rPr lang="en-US" sz="3200" b="0" i="1" smtClean="0">
-                              <a:latin typeface="Cambria Math" panose="02040503050406030204" pitchFamily="18" charset="0"/>
-                            </a:rPr>
-                            <m:t>𝑦</m:t>
-                          </m:r>
-                        </m:e>
-                      </m:d>
-                      <m:r>
-                        <a:rPr lang="en-US" sz="3200" b="0" i="1" smtClean="0">
-                          <a:latin typeface="Cambria Math" panose="02040503050406030204" pitchFamily="18" charset="0"/>
-                        </a:rPr>
-                        <m:t>= </m:t>
-                      </m:r>
-                      <m:sSub>
-                        <m:sSubPr>
-                          <m:ctrlPr>
-                            <a:rPr lang="en-US" sz="3200" b="0" i="1" smtClean="0">
-                              <a:latin typeface="Cambria Math" panose="02040503050406030204" pitchFamily="18" charset="0"/>
-                            </a:rPr>
-                          </m:ctrlPr>
-                        </m:sSubPr>
-                        <m:e>
-                          <m:r>
-                            <a:rPr lang="en-US" sz="3200" b="0" i="1" smtClean="0">
-                              <a:latin typeface="Cambria Math" panose="02040503050406030204" pitchFamily="18" charset="0"/>
-                            </a:rPr>
-                            <m:t>𝜎</m:t>
-                          </m:r>
-                        </m:e>
-                        <m:sub>
-                          <m:d>
-                            <m:dPr>
-                              <m:begChr m:val="{"/>
-                              <m:endChr m:val="}"/>
-                              <m:ctrlPr>
-                                <a:rPr lang="en-US" sz="3200" b="0" i="1" smtClean="0">
-                                  <a:latin typeface="Cambria Math" panose="02040503050406030204" pitchFamily="18" charset="0"/>
-                                </a:rPr>
-                              </m:ctrlPr>
-                            </m:dPr>
-                            <m:e>
-                              <m:r>
-                                <a:rPr lang="en-US" sz="3200" b="0" i="1" smtClean="0">
-                                  <a:latin typeface="Cambria Math" panose="02040503050406030204" pitchFamily="18" charset="0"/>
-                                </a:rPr>
-                                <m:t>𝑥𝑦</m:t>
-                              </m:r>
-                            </m:e>
-                          </m:d>
-                        </m:sub>
-                      </m:sSub>
-                      <m:r>
-                        <a:rPr lang="en-US" sz="3200" b="0" i="1" smtClean="0">
-                          <a:latin typeface="Cambria Math" panose="02040503050406030204" pitchFamily="18" charset="0"/>
-                        </a:rPr>
-                        <m:t>=</m:t>
-                      </m:r>
-                      <m:r>
-                        <a:rPr lang="en-US" sz="3200" b="0" i="1" smtClean="0">
-                          <a:latin typeface="Cambria Math" panose="02040503050406030204" pitchFamily="18" charset="0"/>
-                        </a:rPr>
-                        <m:t>𝐸</m:t>
-                      </m:r>
-                      <m:r>
-                        <a:rPr lang="en-US" sz="3200" b="0" i="1" smtClean="0">
-                          <a:latin typeface="Cambria Math" panose="02040503050406030204" pitchFamily="18" charset="0"/>
-                        </a:rPr>
-                        <m:t>[</m:t>
-                      </m:r>
-                      <m:d>
-                        <m:dPr>
-                          <m:ctrlPr>
-                            <a:rPr lang="en-US" sz="3200" b="0" i="1" smtClean="0">
-                              <a:latin typeface="Cambria Math" panose="02040503050406030204" pitchFamily="18" charset="0"/>
-                            </a:rPr>
-                          </m:ctrlPr>
-                        </m:dPr>
-                        <m:e>
-                          <m:r>
-                            <a:rPr lang="en-US" sz="3200" b="0" i="1" smtClean="0">
-                              <a:latin typeface="Cambria Math" panose="02040503050406030204" pitchFamily="18" charset="0"/>
-                            </a:rPr>
-                            <m:t>𝑥</m:t>
-                          </m:r>
-                          <m:r>
-                            <a:rPr lang="en-US" sz="3200" b="0" i="1" smtClean="0">
-                              <a:latin typeface="Cambria Math" panose="02040503050406030204" pitchFamily="18" charset="0"/>
-                            </a:rPr>
-                            <m:t> −</m:t>
-                          </m:r>
-                          <m:sSub>
-                            <m:sSubPr>
-                              <m:ctrlPr>
-                                <a:rPr lang="en-US" sz="3200" b="0" i="1" smtClean="0">
-                                  <a:latin typeface="Cambria Math" panose="02040503050406030204" pitchFamily="18" charset="0"/>
-                                </a:rPr>
-                              </m:ctrlPr>
-                            </m:sSubPr>
-                            <m:e>
-                              <m:r>
-                                <a:rPr lang="en-US" sz="3200" b="0" i="1" smtClean="0">
-                                  <a:latin typeface="Cambria Math" panose="02040503050406030204" pitchFamily="18" charset="0"/>
-                                </a:rPr>
-                                <m:t>𝜇</m:t>
-                              </m:r>
-                            </m:e>
-                            <m:sub>
-                              <m:r>
-                                <a:rPr lang="en-US" sz="3200" b="0" i="1" smtClean="0">
-                                  <a:latin typeface="Cambria Math" panose="02040503050406030204" pitchFamily="18" charset="0"/>
-                                </a:rPr>
-                                <m:t>𝑥</m:t>
-                              </m:r>
-                            </m:sub>
-                          </m:sSub>
-                        </m:e>
-                      </m:d>
-                      <m:d>
-                        <m:dPr>
-                          <m:ctrlPr>
-                            <a:rPr lang="en-US" sz="3200" b="0" i="1" smtClean="0">
-                              <a:latin typeface="Cambria Math" panose="02040503050406030204" pitchFamily="18" charset="0"/>
-                            </a:rPr>
-                          </m:ctrlPr>
-                        </m:dPr>
-                        <m:e>
-                          <m:r>
-                            <a:rPr lang="en-US" sz="3200" b="0" i="1" smtClean="0">
-                              <a:latin typeface="Cambria Math" panose="02040503050406030204" pitchFamily="18" charset="0"/>
-                            </a:rPr>
-                            <m:t>𝑦</m:t>
-                          </m:r>
-                          <m:r>
-                            <a:rPr lang="en-US" sz="3200" b="0" i="1" smtClean="0">
-                              <a:latin typeface="Cambria Math" panose="02040503050406030204" pitchFamily="18" charset="0"/>
-                            </a:rPr>
-                            <m:t> −</m:t>
-                          </m:r>
-                          <m:sSub>
-                            <m:sSubPr>
-                              <m:ctrlPr>
-                                <a:rPr lang="en-US" sz="3200" b="0" i="1" smtClean="0">
-                                  <a:latin typeface="Cambria Math" panose="02040503050406030204" pitchFamily="18" charset="0"/>
-                                </a:rPr>
-                              </m:ctrlPr>
-                            </m:sSubPr>
-                            <m:e>
-                              <m:r>
-                                <a:rPr lang="en-US" sz="3200" b="0" i="1" smtClean="0">
-                                  <a:latin typeface="Cambria Math" panose="02040503050406030204" pitchFamily="18" charset="0"/>
-                                </a:rPr>
-                                <m:t>𝜇</m:t>
-                              </m:r>
-                            </m:e>
-                            <m:sub>
-                              <m:r>
-                                <a:rPr lang="en-US" sz="3200" b="0" i="1" smtClean="0">
-                                  <a:latin typeface="Cambria Math" panose="02040503050406030204" pitchFamily="18" charset="0"/>
-                                </a:rPr>
-                                <m:t>𝑦</m:t>
-                              </m:r>
-                            </m:sub>
-                          </m:sSub>
-                        </m:e>
-                      </m:d>
-                      <m:r>
-                        <a:rPr lang="en-US" sz="3200" b="0" i="1" smtClean="0">
-                          <a:latin typeface="Cambria Math" panose="02040503050406030204" pitchFamily="18" charset="0"/>
-                        </a:rPr>
-                        <m:t>]</m:t>
-                      </m:r>
-                    </m:oMath>
-                  </m:oMathPara>
-                </a14:m>
-                <a:endParaRPr lang="en-US" sz="3200" dirty="0"/>
-              </a:p>
-            </p:txBody>
-          </p:sp>
-        </mc:Choice>
-        <mc:Fallback xmlns="">
-          <p:sp>
-            <p:nvSpPr>
-              <p:cNvPr id="7" name="TextBox 6">
-                <a:extLst>
-                  <a:ext uri="{FF2B5EF4-FFF2-40B4-BE49-F238E27FC236}">
-                    <a16:creationId xmlns:a16="http://schemas.microsoft.com/office/drawing/2014/main" id="{D74C0E0B-8EFD-8F49-A2A5-53B1E127C608}"/>
-                  </a:ext>
-                </a:extLst>
-              </p:cNvPr>
-              <p:cNvSpPr txBox="1">
-                <a:spLocks noRot="1" noChangeAspect="1" noMove="1" noResize="1" noEditPoints="1" noAdjustHandles="1" noChangeArrowheads="1" noChangeShapeType="1" noTextEdit="1"/>
-              </p:cNvSpPr>
-              <p:nvPr/>
-            </p:nvSpPr>
-            <p:spPr>
-              <a:xfrm>
-                <a:off x="2091267" y="3145717"/>
-                <a:ext cx="7509934" cy="566565"/>
-              </a:xfrm>
-              <a:prstGeom prst="rect">
-                <a:avLst/>
-              </a:prstGeom>
-              <a:blipFill>
-                <a:blip r:embed="rId2"/>
-                <a:stretch>
-                  <a:fillRect r="-1351" b="-23913"/>
-                </a:stretch>
-              </a:blipFill>
-            </p:spPr>
-            <p:txBody>
-              <a:bodyPr/>
-              <a:lstStyle/>
-              <a:p>
-                <a:r>
-                  <a:rPr lang="en-US">
-                    <a:noFill/>
-                  </a:rPr>
-                  <a:t> </a:t>
-                </a:r>
-              </a:p>
-            </p:txBody>
-          </p:sp>
-        </mc:Fallback>
-      </mc:AlternateContent>
+      </p:pic>
+      <p:pic>
+        <p:nvPicPr>
+          <p:cNvPr id="6" name="Picture 5">
+            <a:extLst>
+              <a:ext uri="{FF2B5EF4-FFF2-40B4-BE49-F238E27FC236}">
+                <a16:creationId xmlns:a16="http://schemas.microsoft.com/office/drawing/2014/main" id="{4B4564D4-89AE-DA45-A5CA-5D96B37FAE56}"/>
+              </a:ext>
+            </a:extLst>
+          </p:cNvPr>
+          <p:cNvPicPr>
+            <a:picLocks noChangeAspect="1"/>
+          </p:cNvPicPr>
+          <p:nvPr/>
+        </p:nvPicPr>
+        <p:blipFill>
+          <a:blip r:embed="rId3"/>
+          <a:stretch>
+            <a:fillRect/>
+          </a:stretch>
+        </p:blipFill>
+        <p:spPr>
+          <a:xfrm>
+            <a:off x="838200" y="3122433"/>
+            <a:ext cx="10108842" cy="1910183"/>
+          </a:xfrm>
+          <a:prstGeom prst="rect">
+            <a:avLst/>
+          </a:prstGeom>
+        </p:spPr>
+      </p:pic>
     </p:spTree>
     <p:extLst>
       <p:ext uri="{BB962C8B-B14F-4D97-AF65-F5344CB8AC3E}">
-        <p14:creationId xmlns:p14="http://schemas.microsoft.com/office/powerpoint/2010/main" val="2227399681"/>
+        <p14:creationId xmlns:p14="http://schemas.microsoft.com/office/powerpoint/2010/main" val="761304446"/>
       </p:ext>
     </p:extLst>
   </p:cSld>
@@ -7245,7 +6589,7 @@
           <p:cNvPr id="2" name="Title 1">
             <a:extLst>
               <a:ext uri="{FF2B5EF4-FFF2-40B4-BE49-F238E27FC236}">
-                <a16:creationId xmlns:a16="http://schemas.microsoft.com/office/drawing/2014/main" id="{96A7BA35-06AE-B24B-8303-6D0E399CCABF}"/>
+                <a16:creationId xmlns:a16="http://schemas.microsoft.com/office/drawing/2014/main" id="{F94453CA-8E72-1046-9C22-05CDCEC85236}"/>
               </a:ext>
             </a:extLst>
           </p:cNvPr>
@@ -7263,17 +6607,17 @@
           <a:p>
             <a:r>
               <a:rPr lang="en-US" dirty="0"/>
-              <a:t>Covariance Implications</a:t>
-            </a:r>
-          </a:p>
-        </p:txBody>
-      </p:sp>
-      <p:sp>
-        <p:nvSpPr>
-          <p:cNvPr id="3" name="Content Placeholder 2">
-            <a:extLst>
-              <a:ext uri="{FF2B5EF4-FFF2-40B4-BE49-F238E27FC236}">
-                <a16:creationId xmlns:a16="http://schemas.microsoft.com/office/drawing/2014/main" id="{31D04106-B9C6-424A-94C3-648465DB6900}"/>
+              <a:t>Standardized Variables</a:t>
+            </a:r>
+          </a:p>
+        </p:txBody>
+      </p:sp>
+      <p:sp>
+        <p:nvSpPr>
+          <p:cNvPr id="6" name="Content Placeholder 5">
+            <a:extLst>
+              <a:ext uri="{FF2B5EF4-FFF2-40B4-BE49-F238E27FC236}">
+                <a16:creationId xmlns:a16="http://schemas.microsoft.com/office/drawing/2014/main" id="{00B67773-48CC-AB4A-8836-73DA6280A6F1}"/>
               </a:ext>
             </a:extLst>
           </p:cNvPr>
@@ -7291,36 +6635,112 @@
           <a:p>
             <a:r>
               <a:rPr lang="en-US" dirty="0"/>
-              <a:t>If covariance is 0 are the two variables independent?</a:t>
-            </a:r>
-          </a:p>
-          <a:p>
+              <a:t>A standardized vector can be obtained in two ways:</a:t>
+            </a:r>
+          </a:p>
+          <a:p>
+            <a:pPr lvl="1"/>
             <a:endParaRPr lang="en-US" dirty="0"/>
           </a:p>
           <a:p>
             <a:endParaRPr lang="en-US" dirty="0"/>
           </a:p>
-          <a:p>
-            <a:endParaRPr lang="en-US" dirty="0"/>
-          </a:p>
-          <a:p>
-            <a:endParaRPr lang="en-US" dirty="0"/>
-          </a:p>
-          <a:p>
-            <a:endParaRPr lang="en-US" dirty="0"/>
-          </a:p>
-          <a:p>
-            <a:endParaRPr lang="en-US" dirty="0"/>
-          </a:p>
-          <a:p>
-            <a:endParaRPr lang="en-US" dirty="0"/>
-          </a:p>
-        </p:txBody>
-      </p:sp>
+        </p:txBody>
+      </p:sp>
+      <p:pic>
+        <p:nvPicPr>
+          <p:cNvPr id="7" name="Picture 6">
+            <a:extLst>
+              <a:ext uri="{FF2B5EF4-FFF2-40B4-BE49-F238E27FC236}">
+                <a16:creationId xmlns:a16="http://schemas.microsoft.com/office/drawing/2014/main" id="{4012EDC2-0FAB-204C-973F-B1546F861CA7}"/>
+              </a:ext>
+            </a:extLst>
+          </p:cNvPr>
+          <p:cNvPicPr>
+            <a:picLocks noChangeAspect="1"/>
+          </p:cNvPicPr>
+          <p:nvPr/>
+        </p:nvPicPr>
+        <p:blipFill>
+          <a:blip r:embed="rId2"/>
+          <a:stretch>
+            <a:fillRect/>
+          </a:stretch>
+        </p:blipFill>
+        <p:spPr>
+          <a:xfrm>
+            <a:off x="1810555" y="2217402"/>
+            <a:ext cx="4114800" cy="774700"/>
+          </a:xfrm>
+          <a:prstGeom prst="rect">
+            <a:avLst/>
+          </a:prstGeom>
+        </p:spPr>
+      </p:pic>
+      <p:pic>
+        <p:nvPicPr>
+          <p:cNvPr id="8" name="Picture 7">
+            <a:extLst>
+              <a:ext uri="{FF2B5EF4-FFF2-40B4-BE49-F238E27FC236}">
+                <a16:creationId xmlns:a16="http://schemas.microsoft.com/office/drawing/2014/main" id="{A5FAF410-99E5-5C48-BD16-7497C5EC33D6}"/>
+              </a:ext>
+            </a:extLst>
+          </p:cNvPr>
+          <p:cNvPicPr>
+            <a:picLocks noChangeAspect="1"/>
+          </p:cNvPicPr>
+          <p:nvPr/>
+        </p:nvPicPr>
+        <p:blipFill>
+          <a:blip r:embed="rId3"/>
+          <a:stretch>
+            <a:fillRect/>
+          </a:stretch>
+        </p:blipFill>
+        <p:spPr>
+          <a:xfrm>
+            <a:off x="838320" y="2898356"/>
+            <a:ext cx="10174070" cy="530644"/>
+          </a:xfrm>
+          <a:prstGeom prst="rect">
+            <a:avLst/>
+          </a:prstGeom>
+        </p:spPr>
+      </p:pic>
+      <p:pic>
+        <p:nvPicPr>
+          <p:cNvPr id="9" name="Picture 8">
+            <a:extLst>
+              <a:ext uri="{FF2B5EF4-FFF2-40B4-BE49-F238E27FC236}">
+                <a16:creationId xmlns:a16="http://schemas.microsoft.com/office/drawing/2014/main" id="{860AF7C7-FD64-D247-B1A0-4279574F135C}"/>
+              </a:ext>
+            </a:extLst>
+          </p:cNvPr>
+          <p:cNvPicPr>
+            <a:picLocks noChangeAspect="1"/>
+          </p:cNvPicPr>
+          <p:nvPr/>
+        </p:nvPicPr>
+        <p:blipFill>
+          <a:blip r:embed="rId4"/>
+          <a:stretch>
+            <a:fillRect/>
+          </a:stretch>
+        </p:blipFill>
+        <p:spPr>
+          <a:xfrm>
+            <a:off x="838200" y="4001294"/>
+            <a:ext cx="6781800" cy="1257300"/>
+          </a:xfrm>
+          <a:prstGeom prst="rect">
+            <a:avLst/>
+          </a:prstGeom>
+        </p:spPr>
+      </p:pic>
     </p:spTree>
     <p:extLst>
       <p:ext uri="{BB962C8B-B14F-4D97-AF65-F5344CB8AC3E}">
-        <p14:creationId xmlns:p14="http://schemas.microsoft.com/office/powerpoint/2010/main" val="3330221846"/>
+        <p14:creationId xmlns:p14="http://schemas.microsoft.com/office/powerpoint/2010/main" val="3215217334"/>
       </p:ext>
     </p:extLst>
   </p:cSld>
@@ -7352,7 +6772,7 @@
           <p:cNvPr id="2" name="Title 1">
             <a:extLst>
               <a:ext uri="{FF2B5EF4-FFF2-40B4-BE49-F238E27FC236}">
-                <a16:creationId xmlns:a16="http://schemas.microsoft.com/office/drawing/2014/main" id="{0E268C4A-4BFC-514F-86C1-D2C3DFB595B8}"/>
+                <a16:creationId xmlns:a16="http://schemas.microsoft.com/office/drawing/2014/main" id="{E5AD7C95-9D22-7C46-B4BA-CF31188900DA}"/>
               </a:ext>
             </a:extLst>
           </p:cNvPr>
@@ -7368,48 +6788,28 @@
           <a:bodyPr/>
           <a:lstStyle/>
           <a:p>
-            <a:endParaRPr lang="en-US"/>
-          </a:p>
-        </p:txBody>
-      </p:sp>
-      <p:sp>
-        <p:nvSpPr>
-          <p:cNvPr id="3" name="Content Placeholder 2">
-            <a:extLst>
-              <a:ext uri="{FF2B5EF4-FFF2-40B4-BE49-F238E27FC236}">
-                <a16:creationId xmlns:a16="http://schemas.microsoft.com/office/drawing/2014/main" id="{EF94DB2B-34D3-B741-9DAD-C38DC235A72C}"/>
-              </a:ext>
-            </a:extLst>
-          </p:cNvPr>
-          <p:cNvSpPr>
-            <a:spLocks noGrp="1"/>
-          </p:cNvSpPr>
-          <p:nvPr>
-            <p:ph idx="1"/>
-          </p:nvPr>
-        </p:nvSpPr>
-        <p:spPr/>
-        <p:txBody>
-          <a:bodyPr/>
-          <a:lstStyle/>
-          <a:p>
-            <a:endParaRPr lang="en-US"/>
+            <a:r>
+              <a:rPr lang="en-US" dirty="0"/>
+              <a:t>Chi-square distribution</a:t>
+            </a:r>
           </a:p>
         </p:txBody>
       </p:sp>
       <p:pic>
         <p:nvPicPr>
-          <p:cNvPr id="4" name="Picture 3">
-            <a:extLst>
-              <a:ext uri="{FF2B5EF4-FFF2-40B4-BE49-F238E27FC236}">
-                <a16:creationId xmlns:a16="http://schemas.microsoft.com/office/drawing/2014/main" id="{1CD15F9E-7CB4-7B42-AB76-5AB74FA0A1B0}"/>
+          <p:cNvPr id="4" name="Content Placeholder 3">
+            <a:extLst>
+              <a:ext uri="{FF2B5EF4-FFF2-40B4-BE49-F238E27FC236}">
+                <a16:creationId xmlns:a16="http://schemas.microsoft.com/office/drawing/2014/main" id="{5D732057-CFD4-9A41-85CE-F62C0E08D694}"/>
               </a:ext>
             </a:extLst>
           </p:cNvPr>
           <p:cNvPicPr>
-            <a:picLocks noChangeAspect="1"/>
+            <a:picLocks noGrp="1" noChangeAspect="1"/>
           </p:cNvPicPr>
-          <p:nvPr/>
+          <p:nvPr>
+            <p:ph idx="1"/>
+          </p:nvPr>
         </p:nvPicPr>
         <p:blipFill>
           <a:blip r:embed="rId2"/>
@@ -7419,8 +6819,8 @@
         </p:blipFill>
         <p:spPr>
           <a:xfrm>
-            <a:off x="2486550" y="966389"/>
-            <a:ext cx="7218900" cy="5290477"/>
+            <a:off x="838200" y="2236713"/>
+            <a:ext cx="10515600" cy="2988246"/>
           </a:xfrm>
           <a:prstGeom prst="rect">
             <a:avLst/>
@@ -7430,7 +6830,7 @@
     </p:spTree>
     <p:extLst>
       <p:ext uri="{BB962C8B-B14F-4D97-AF65-F5344CB8AC3E}">
-        <p14:creationId xmlns:p14="http://schemas.microsoft.com/office/powerpoint/2010/main" val="2667668370"/>
+        <p14:creationId xmlns:p14="http://schemas.microsoft.com/office/powerpoint/2010/main" val="2932015037"/>
       </p:ext>
     </p:extLst>
   </p:cSld>

</xml_diff>